<commit_message>
Version of Gregory before Soren touches it ;)
</commit_message>
<xml_diff>
--- a/exo-sysAdmin/970-LdapConfig-XSys.pptx
+++ b/exo-sysAdmin/970-LdapConfig-XSys.pptx
@@ -7,7 +7,7 @@
     <p:sldMasterId id="2147483650" r:id="rId3"/>
   </p:sldMasterIdLst>
   <p:notesMasterIdLst>
-    <p:notesMasterId r:id="rId43"/>
+    <p:notesMasterId r:id="rId46"/>
   </p:notesMasterIdLst>
   <p:sldIdLst>
     <p:sldId id="256" r:id="rId4"/>
@@ -48,7 +48,10 @@
     <p:sldId id="432" r:id="rId39"/>
     <p:sldId id="441" r:id="rId40"/>
     <p:sldId id="442" r:id="rId41"/>
-    <p:sldId id="394" r:id="rId42"/>
+    <p:sldId id="445" r:id="rId42"/>
+    <p:sldId id="443" r:id="rId43"/>
+    <p:sldId id="444" r:id="rId44"/>
+    <p:sldId id="394" r:id="rId45"/>
   </p:sldIdLst>
   <p:sldSz cx="11160125" cy="7559675"/>
   <p:notesSz cx="7772400" cy="10058400"/>
@@ -2874,7 +2877,7 @@
             <a:fld id="{43F345E1-DE08-49C4-9805-072619C6BD24}" type="slidenum">
               <a:rPr lang="en-GB"/>
               <a:pPr/>
-              <a:t>39</a:t>
+              <a:t>42</a:t>
             </a:fld>
             <a:endParaRPr lang="en-GB"/>
           </a:p>
@@ -2977,7 +2980,7 @@
                   <a:tab pos="9144000" algn="l"/>
                 </a:tabLst>
               </a:pPr>
-              <a:t>39</a:t>
+              <a:t>42</a:t>
             </a:fld>
             <a:endParaRPr lang="en-GB" sz="1400">
               <a:solidFill>
@@ -34818,14 +34821,6 @@
               </a:rPr>
               <a:t>.</a:t>
             </a:r>
-            <a:endParaRPr lang="fr-FR" sz="2200" i="0" dirty="0" smtClean="0">
-              <a:solidFill>
-                <a:schemeClr val="tx1">
-                  <a:lumMod val="75000"/>
-                  <a:lumOff val="25000"/>
-                </a:schemeClr>
-              </a:solidFill>
-            </a:endParaRPr>
           </a:p>
           <a:p>
             <a:pPr>
@@ -35045,29 +35040,7 @@
                   </a:schemeClr>
                 </a:solidFill>
               </a:rPr>
-              <a:t> « local </a:t>
-            </a:r>
-            <a:r>
-              <a:rPr lang="fr-FR" sz="2200" i="0" dirty="0" smtClean="0">
-                <a:solidFill>
-                  <a:schemeClr val="tx1">
-                    <a:lumMod val="75000"/>
-                    <a:lumOff val="25000"/>
-                  </a:schemeClr>
-                </a:solidFill>
-              </a:rPr>
-              <a:t>server» </a:t>
-            </a:r>
-            <a:r>
-              <a:rPr lang="fr-FR" sz="2200" i="0" dirty="0" smtClean="0">
-                <a:solidFill>
-                  <a:schemeClr val="tx1">
-                    <a:lumMod val="75000"/>
-                    <a:lumOff val="25000"/>
-                  </a:schemeClr>
-                </a:solidFill>
-              </a:rPr>
-              <a:t>as the server to </a:t>
+              <a:t> « local server» as the server to </a:t>
             </a:r>
             <a:r>
               <a:rPr lang="fr-FR" sz="2200" i="0" dirty="0" err="1" smtClean="0">
@@ -35220,18 +35193,7 @@
                   </a:schemeClr>
                 </a:solidFill>
               </a:rPr>
-              <a:t>2.4.3 </a:t>
-            </a:r>
-            <a:r>
-              <a:rPr lang="fr-FR" sz="2200" i="0" dirty="0" smtClean="0">
-                <a:solidFill>
-                  <a:schemeClr val="tx1">
-                    <a:lumMod val="75000"/>
-                    <a:lumOff val="25000"/>
-                  </a:schemeClr>
-                </a:solidFill>
-              </a:rPr>
-              <a:t>server </a:t>
+              <a:t>2.4.3 server </a:t>
             </a:r>
             <a:r>
               <a:rPr lang="fr-FR" sz="2200" i="0" dirty="0" err="1" smtClean="0">
@@ -35611,11 +35573,7 @@
             </a:r>
             <a:r>
               <a:rPr lang="fr-FR" dirty="0" smtClean="0"/>
-              <a:t> </a:t>
-            </a:r>
-            <a:r>
-              <a:rPr lang="fr-FR" dirty="0" smtClean="0"/>
-              <a:t>– </a:t>
+              <a:t> – </a:t>
             </a:r>
             <a:r>
               <a:rPr lang="fr-FR" dirty="0" err="1" smtClean="0"/>
@@ -35665,7 +35623,29 @@
                   </a:schemeClr>
                 </a:solidFill>
               </a:rPr>
-              <a:t> To configure </a:t>
+              <a:t>Copy </a:t>
+            </a:r>
+            <a:r>
+              <a:rPr lang="fr-FR" sz="2200" i="0" dirty="0">
+                <a:solidFill>
+                  <a:schemeClr val="tx1">
+                    <a:lumMod val="75000"/>
+                    <a:lumOff val="25000"/>
+                  </a:schemeClr>
+                </a:solidFill>
+              </a:rPr>
+              <a:t>the </a:t>
+            </a:r>
+            <a:r>
+              <a:rPr lang="fr-FR" sz="2200" i="0" dirty="0" smtClean="0">
+                <a:solidFill>
+                  <a:schemeClr val="tx1">
+                    <a:lumMod val="75000"/>
+                    <a:lumOff val="25000"/>
+                  </a:schemeClr>
+                </a:solidFill>
+              </a:rPr>
+              <a:t>portal </a:t>
             </a:r>
             <a:r>
               <a:rPr lang="fr-FR" sz="2200" i="0" dirty="0" err="1" smtClean="0">
@@ -35676,7 +35656,7 @@
                   </a:schemeClr>
                 </a:solidFill>
               </a:rPr>
-              <a:t>eXo</a:t>
+              <a:t>folder</a:t>
             </a:r>
             <a:r>
               <a:rPr lang="fr-FR" sz="2200" i="0" dirty="0" smtClean="0">
@@ -35687,7 +35667,7 @@
                   </a:schemeClr>
                 </a:solidFill>
               </a:rPr>
-              <a:t> to use </a:t>
+              <a:t> in </a:t>
             </a:r>
             <a:r>
               <a:rPr lang="fr-FR" sz="2200" i="0" dirty="0" err="1" smtClean="0">
@@ -35698,39 +35678,7 @@
                   </a:schemeClr>
                 </a:solidFill>
               </a:rPr>
-              <a:t>ldap</a:t>
-            </a:r>
-            <a:endParaRPr lang="fr-FR" sz="2200" i="0" dirty="0">
-              <a:solidFill>
-                <a:schemeClr val="tx1">
-                  <a:lumMod val="75000"/>
-                  <a:lumOff val="25000"/>
-                </a:schemeClr>
-              </a:solidFill>
-            </a:endParaRPr>
-          </a:p>
-          <a:p>
-            <a:pPr>
-              <a:lnSpc>
-                <a:spcPct val="100000"/>
-              </a:lnSpc>
-              <a:buClr>
-                <a:srgbClr val="FF9900"/>
-              </a:buClr>
-              <a:buSzPct val="120000"/>
-              <a:buFont typeface="Lucida Grande"/>
-              <a:buChar char="»"/>
-            </a:pPr>
-            <a:r>
-              <a:rPr lang="fr-FR" sz="2200" i="0" dirty="0">
-                <a:solidFill>
-                  <a:schemeClr val="tx1">
-                    <a:lumMod val="75000"/>
-                    <a:lumOff val="25000"/>
-                  </a:schemeClr>
-                </a:solidFill>
-              </a:rPr>
-              <a:t> Copy the </a:t>
+              <a:t>tomcat_home</a:t>
             </a:r>
             <a:r>
               <a:rPr lang="fr-FR" sz="2200" i="0" dirty="0" smtClean="0">
@@ -35741,7 +35689,7 @@
                   </a:schemeClr>
                 </a:solidFill>
               </a:rPr>
-              <a:t>portal </a:t>
+              <a:t>/</a:t>
             </a:r>
             <a:r>
               <a:rPr lang="fr-FR" sz="2200" i="0" dirty="0" err="1" smtClean="0">
@@ -35752,7 +35700,7 @@
                   </a:schemeClr>
                 </a:solidFill>
               </a:rPr>
-              <a:t>folder</a:t>
+              <a:t>gatein</a:t>
             </a:r>
             <a:r>
               <a:rPr lang="fr-FR" sz="2200" i="0" dirty="0" smtClean="0">
@@ -35763,7 +35711,7 @@
                   </a:schemeClr>
                 </a:solidFill>
               </a:rPr>
-              <a:t> in </a:t>
+              <a:t>/</a:t>
             </a:r>
             <a:r>
               <a:rPr lang="fr-FR" sz="2200" i="0" dirty="0" err="1" smtClean="0">
@@ -35774,7 +35722,7 @@
                   </a:schemeClr>
                 </a:solidFill>
               </a:rPr>
-              <a:t>tomcat_home</a:t>
+              <a:t>conf</a:t>
             </a:r>
             <a:r>
               <a:rPr lang="fr-FR" sz="2200" i="0" dirty="0" smtClean="0">
@@ -35785,60 +35733,8 @@
                   </a:schemeClr>
                 </a:solidFill>
               </a:rPr>
-              <a:t>/</a:t>
-            </a:r>
-            <a:r>
-              <a:rPr lang="fr-FR" sz="2200" i="0" dirty="0" err="1" smtClean="0">
-                <a:solidFill>
-                  <a:schemeClr val="tx1">
-                    <a:lumMod val="75000"/>
-                    <a:lumOff val="25000"/>
-                  </a:schemeClr>
-                </a:solidFill>
-              </a:rPr>
-              <a:t>gatein</a:t>
-            </a:r>
-            <a:r>
-              <a:rPr lang="fr-FR" sz="2200" i="0" dirty="0" smtClean="0">
-                <a:solidFill>
-                  <a:schemeClr val="tx1">
-                    <a:lumMod val="75000"/>
-                    <a:lumOff val="25000"/>
-                  </a:schemeClr>
-                </a:solidFill>
-              </a:rPr>
-              <a:t>/</a:t>
-            </a:r>
-            <a:r>
-              <a:rPr lang="fr-FR" sz="2200" i="0" dirty="0" err="1" smtClean="0">
-                <a:solidFill>
-                  <a:schemeClr val="tx1">
-                    <a:lumMod val="75000"/>
-                    <a:lumOff val="25000"/>
-                  </a:schemeClr>
-                </a:solidFill>
-              </a:rPr>
-              <a:t>conf</a:t>
-            </a:r>
-            <a:r>
-              <a:rPr lang="fr-FR" sz="2200" i="0" dirty="0" smtClean="0">
-                <a:solidFill>
-                  <a:schemeClr val="tx1">
-                    <a:lumMod val="75000"/>
-                    <a:lumOff val="25000"/>
-                  </a:schemeClr>
-                </a:solidFill>
-              </a:rPr>
               <a:t> directory</a:t>
             </a:r>
-            <a:endParaRPr lang="fr-FR" sz="2200" i="0" dirty="0" smtClean="0">
-              <a:solidFill>
-                <a:schemeClr val="tx1">
-                  <a:lumMod val="75000"/>
-                  <a:lumOff val="25000"/>
-                </a:schemeClr>
-              </a:solidFill>
-            </a:endParaRPr>
           </a:p>
           <a:p>
             <a:pPr>
@@ -39775,15 +39671,7 @@
             </a:r>
             <a:r>
               <a:rPr lang="fr-FR" dirty="0" smtClean="0"/>
-              <a:t> </a:t>
-            </a:r>
-            <a:r>
-              <a:rPr lang="fr-FR" dirty="0" smtClean="0"/>
-              <a:t>70b </a:t>
-            </a:r>
-            <a:r>
-              <a:rPr lang="fr-FR" dirty="0" smtClean="0"/>
-              <a:t>: Configuration </a:t>
+              <a:t> 70b : Configuration </a:t>
             </a:r>
             <a:r>
               <a:rPr lang="fr-FR" dirty="0" err="1" smtClean="0"/>
@@ -41055,15 +40943,7 @@
             </a:r>
             <a:r>
               <a:rPr lang="fr-FR" dirty="0" smtClean="0"/>
-              <a:t> </a:t>
-            </a:r>
-            <a:r>
-              <a:rPr lang="fr-FR" dirty="0" smtClean="0"/>
-              <a:t>70b </a:t>
-            </a:r>
-            <a:r>
-              <a:rPr lang="fr-FR" dirty="0" smtClean="0"/>
-              <a:t>: Configuration </a:t>
+              <a:t> 70b : Configuration </a:t>
             </a:r>
             <a:r>
               <a:rPr lang="fr-FR" dirty="0" err="1" smtClean="0"/>
@@ -42010,15 +41890,7 @@
             </a:r>
             <a:r>
               <a:rPr lang="fr-FR" dirty="0" smtClean="0"/>
-              <a:t> </a:t>
-            </a:r>
-            <a:r>
-              <a:rPr lang="fr-FR" dirty="0" smtClean="0"/>
-              <a:t>70b </a:t>
-            </a:r>
-            <a:r>
-              <a:rPr lang="fr-FR" dirty="0" smtClean="0"/>
-              <a:t>: Configuration </a:t>
+              <a:t> 70b : Configuration </a:t>
             </a:r>
             <a:r>
               <a:rPr lang="fr-FR" dirty="0" err="1" smtClean="0"/>
@@ -44248,19 +44120,7 @@
             </a:r>
             <a:r>
               <a:rPr lang="fr-FR" dirty="0" smtClean="0"/>
-              <a:t> </a:t>
-            </a:r>
-            <a:r>
-              <a:rPr lang="fr-FR" dirty="0" smtClean="0"/>
-              <a:t>70c </a:t>
-            </a:r>
-            <a:r>
-              <a:rPr lang="fr-FR" dirty="0" smtClean="0"/>
-              <a:t>: </a:t>
-            </a:r>
-            <a:r>
-              <a:rPr lang="fr-FR" dirty="0" smtClean="0"/>
-              <a:t>SSO CAS</a:t>
+              <a:t> 70c : SSO CAS</a:t>
             </a:r>
             <a:endParaRPr lang="fr-FR" dirty="0"/>
           </a:p>
@@ -44298,8 +44158,396 @@
               <a:buChar char="»"/>
             </a:pPr>
             <a:r>
-              <a:rPr lang="fr-FR" sz="2200" i="0" smtClean="0"/>
-              <a:t>..</a:t>
+              <a:rPr lang="fr-FR" sz="2400" i="0" dirty="0"/>
+              <a:t>The </a:t>
+            </a:r>
+            <a:r>
+              <a:rPr lang="fr-FR" sz="2400" i="0" dirty="0" err="1"/>
+              <a:t>integration</a:t>
+            </a:r>
+            <a:r>
+              <a:rPr lang="fr-FR" sz="2400" i="0" dirty="0"/>
+              <a:t> </a:t>
+            </a:r>
+            <a:r>
+              <a:rPr lang="fr-FR" sz="2400" i="0" dirty="0" err="1"/>
+              <a:t>consists</a:t>
+            </a:r>
+            <a:r>
+              <a:rPr lang="fr-FR" sz="2400" i="0" dirty="0"/>
+              <a:t> of </a:t>
+            </a:r>
+            <a:r>
+              <a:rPr lang="fr-FR" sz="2400" i="0" dirty="0" err="1"/>
+              <a:t>two</a:t>
+            </a:r>
+            <a:r>
+              <a:rPr lang="fr-FR" sz="2400" i="0" dirty="0"/>
+              <a:t> </a:t>
+            </a:r>
+            <a:r>
+              <a:rPr lang="fr-FR" sz="2400" i="0" dirty="0" smtClean="0"/>
+              <a:t>parts</a:t>
+            </a:r>
+            <a:r>
+              <a:rPr lang="fr-FR" sz="2400" i="0" dirty="0"/>
+              <a:t> </a:t>
+            </a:r>
+            <a:r>
+              <a:rPr lang="fr-FR" sz="2400" i="0" dirty="0" smtClean="0"/>
+              <a:t>: </a:t>
+            </a:r>
+          </a:p>
+          <a:p>
+            <a:pPr marL="3175" indent="0">
+              <a:lnSpc>
+                <a:spcPct val="100000"/>
+              </a:lnSpc>
+              <a:buClr>
+                <a:srgbClr val="FF9900"/>
+              </a:buClr>
+              <a:buSzPct val="120000"/>
+              <a:buNone/>
+            </a:pPr>
+            <a:r>
+              <a:rPr lang="fr-FR" sz="2400" i="0" dirty="0"/>
+              <a:t> </a:t>
+            </a:r>
+            <a:r>
+              <a:rPr lang="fr-FR" sz="2400" i="0" dirty="0" smtClean="0"/>
+              <a:t>- the </a:t>
+            </a:r>
+            <a:r>
+              <a:rPr lang="fr-FR" sz="2400" i="0" dirty="0"/>
+              <a:t>first part </a:t>
+            </a:r>
+            <a:r>
+              <a:rPr lang="fr-FR" sz="2400" i="0" dirty="0" err="1"/>
+              <a:t>consists</a:t>
+            </a:r>
+            <a:r>
+              <a:rPr lang="fr-FR" sz="2400" i="0" dirty="0"/>
+              <a:t> of </a:t>
+            </a:r>
+            <a:r>
+              <a:rPr lang="fr-FR" sz="2400" i="0" dirty="0" err="1"/>
+              <a:t>installing</a:t>
+            </a:r>
+            <a:r>
+              <a:rPr lang="fr-FR" sz="2400" i="0" dirty="0"/>
+              <a:t> or </a:t>
+            </a:r>
+            <a:r>
+              <a:rPr lang="fr-FR" sz="2400" i="0" dirty="0" err="1"/>
+              <a:t>configuring</a:t>
+            </a:r>
+            <a:r>
+              <a:rPr lang="fr-FR" sz="2400" i="0" dirty="0"/>
+              <a:t> a CAS </a:t>
+            </a:r>
+            <a:r>
+              <a:rPr lang="fr-FR" sz="2400" i="0" dirty="0" smtClean="0"/>
+              <a:t>server</a:t>
+            </a:r>
+            <a:endParaRPr lang="fr-FR" sz="2400" i="0" dirty="0"/>
+          </a:p>
+          <a:p>
+            <a:pPr marL="3175" indent="0">
+              <a:lnSpc>
+                <a:spcPct val="100000"/>
+              </a:lnSpc>
+              <a:buClr>
+                <a:srgbClr val="FF9900"/>
+              </a:buClr>
+              <a:buSzPct val="120000"/>
+              <a:buNone/>
+            </a:pPr>
+            <a:r>
+              <a:rPr lang="fr-FR" sz="2400" i="0" dirty="0" smtClean="0"/>
+              <a:t> - the </a:t>
+            </a:r>
+            <a:r>
+              <a:rPr lang="fr-FR" sz="2400" i="0" dirty="0"/>
+              <a:t>second part </a:t>
+            </a:r>
+            <a:r>
+              <a:rPr lang="fr-FR" sz="2400" i="0" dirty="0" err="1"/>
+              <a:t>consists</a:t>
+            </a:r>
+            <a:r>
+              <a:rPr lang="fr-FR" sz="2400" i="0" dirty="0"/>
+              <a:t> of setting up the portal to use the CAS server. </a:t>
+            </a:r>
+            <a:endParaRPr lang="fr-FR" sz="2400" i="0" dirty="0" smtClean="0"/>
+          </a:p>
+          <a:p>
+            <a:pPr>
+              <a:lnSpc>
+                <a:spcPct val="100000"/>
+              </a:lnSpc>
+              <a:buClr>
+                <a:srgbClr val="FF9900"/>
+              </a:buClr>
+              <a:buSzPct val="120000"/>
+              <a:buFont typeface="Lucida Grande"/>
+              <a:buChar char="»"/>
+            </a:pPr>
+            <a:r>
+              <a:rPr lang="fr-FR" sz="2200" i="0" dirty="0" smtClean="0"/>
+              <a:t>To </a:t>
+            </a:r>
+            <a:r>
+              <a:rPr lang="fr-FR" sz="2200" i="0" dirty="0" err="1" smtClean="0"/>
+              <a:t>install</a:t>
+            </a:r>
+            <a:r>
+              <a:rPr lang="fr-FR" sz="2200" i="0" dirty="0" smtClean="0"/>
+              <a:t> the CAS server, </a:t>
+            </a:r>
+            <a:r>
+              <a:rPr lang="fr-FR" sz="2200" i="0" dirty="0"/>
+              <a:t>copy the </a:t>
+            </a:r>
+            <a:r>
+              <a:rPr lang="fr-FR" sz="2200" i="0" dirty="0" err="1" smtClean="0"/>
+              <a:t>cas.war</a:t>
+            </a:r>
+            <a:r>
+              <a:rPr lang="fr-FR" sz="2200" i="0" dirty="0" smtClean="0"/>
+              <a:t> </a:t>
+            </a:r>
+            <a:r>
+              <a:rPr lang="fr-FR" sz="2200" i="0" dirty="0" smtClean="0"/>
+              <a:t>in the </a:t>
+            </a:r>
+            <a:r>
+              <a:rPr lang="fr-FR" sz="2200" i="0" dirty="0" err="1" smtClean="0"/>
+              <a:t>tomcat</a:t>
+            </a:r>
+            <a:r>
+              <a:rPr lang="fr-FR" sz="2200" i="0" dirty="0" smtClean="0"/>
+              <a:t>/</a:t>
+            </a:r>
+            <a:r>
+              <a:rPr lang="fr-FR" sz="2200" i="0" dirty="0" err="1" smtClean="0"/>
+              <a:t>webapp</a:t>
+            </a:r>
+            <a:endParaRPr lang="fr-FR" sz="2200" i="0" dirty="0" smtClean="0"/>
+          </a:p>
+          <a:p>
+            <a:pPr>
+              <a:lnSpc>
+                <a:spcPct val="100000"/>
+              </a:lnSpc>
+              <a:buClr>
+                <a:srgbClr val="FF9900"/>
+              </a:buClr>
+              <a:buSzPct val="120000"/>
+              <a:buFont typeface="Lucida Grande"/>
+              <a:buChar char="»"/>
+            </a:pPr>
+            <a:r>
+              <a:rPr lang="fr-FR" sz="2200" i="0" dirty="0" smtClean="0"/>
+              <a:t>For the </a:t>
+            </a:r>
+            <a:r>
+              <a:rPr lang="fr-FR" sz="2200" i="0" dirty="0" err="1" smtClean="0"/>
+              <a:t>exercise</a:t>
+            </a:r>
+            <a:r>
+              <a:rPr lang="fr-FR" sz="2200" i="0" dirty="0" smtClean="0"/>
+              <a:t>, </a:t>
+            </a:r>
+            <a:r>
+              <a:rPr lang="fr-FR" sz="2200" i="0" dirty="0" err="1" smtClean="0"/>
+              <a:t>we</a:t>
+            </a:r>
+            <a:r>
+              <a:rPr lang="fr-FR" sz="2200" i="0" dirty="0" smtClean="0"/>
+              <a:t> </a:t>
+            </a:r>
+            <a:r>
+              <a:rPr lang="fr-FR" sz="2200" i="0" dirty="0" err="1" smtClean="0"/>
+              <a:t>will</a:t>
+            </a:r>
+            <a:r>
+              <a:rPr lang="fr-FR" sz="2200" i="0" dirty="0" smtClean="0"/>
+              <a:t> </a:t>
+            </a:r>
+            <a:r>
+              <a:rPr lang="fr-FR" sz="2200" i="0" dirty="0" err="1" smtClean="0"/>
+              <a:t>deploy</a:t>
+            </a:r>
+            <a:r>
+              <a:rPr lang="fr-FR" sz="2200" i="0" dirty="0" smtClean="0"/>
+              <a:t> the CAS on the </a:t>
+            </a:r>
+            <a:r>
+              <a:rPr lang="fr-FR" sz="2200" i="0" dirty="0" err="1" smtClean="0"/>
+              <a:t>same</a:t>
+            </a:r>
+            <a:r>
+              <a:rPr lang="fr-FR" sz="2200" i="0" dirty="0" smtClean="0"/>
+              <a:t> </a:t>
+            </a:r>
+            <a:r>
+              <a:rPr lang="fr-FR" sz="2200" i="0" dirty="0" err="1" smtClean="0"/>
+              <a:t>tomcat</a:t>
+            </a:r>
+            <a:r>
+              <a:rPr lang="fr-FR" sz="2200" i="0" dirty="0"/>
+              <a:t> </a:t>
+            </a:r>
+            <a:r>
+              <a:rPr lang="fr-FR" sz="2200" i="0" dirty="0" smtClean="0"/>
+              <a:t>as </a:t>
+            </a:r>
+            <a:r>
+              <a:rPr lang="fr-FR" sz="2200" i="0" dirty="0" err="1" smtClean="0"/>
+              <a:t>eXo</a:t>
+            </a:r>
+            <a:r>
+              <a:rPr lang="fr-FR" sz="2200" i="0" dirty="0" smtClean="0"/>
+              <a:t>, on production environnement, CAS server </a:t>
+            </a:r>
+            <a:r>
+              <a:rPr lang="fr-FR" sz="2200" i="0" dirty="0" err="1" smtClean="0"/>
+              <a:t>run</a:t>
+            </a:r>
+            <a:r>
+              <a:rPr lang="fr-FR" sz="2200" i="0" dirty="0" smtClean="0"/>
+              <a:t> on a </a:t>
+            </a:r>
+            <a:r>
+              <a:rPr lang="fr-FR" sz="2200" i="0" dirty="0" err="1" smtClean="0"/>
+              <a:t>standalone</a:t>
+            </a:r>
+            <a:r>
+              <a:rPr lang="fr-FR" sz="2200" i="0" dirty="0" smtClean="0"/>
+              <a:t> server.</a:t>
+            </a:r>
+            <a:endParaRPr lang="fr-FR" sz="2200" i="0" dirty="0" smtClean="0"/>
+          </a:p>
+          <a:p>
+            <a:pPr>
+              <a:lnSpc>
+                <a:spcPct val="100000"/>
+              </a:lnSpc>
+              <a:buClr>
+                <a:srgbClr val="FF9900"/>
+              </a:buClr>
+              <a:buSzPct val="120000"/>
+              <a:buFont typeface="Lucida Grande"/>
+              <a:buChar char="»"/>
+            </a:pPr>
+            <a:r>
+              <a:rPr lang="fr-FR" sz="2200" i="0" dirty="0" err="1" smtClean="0"/>
+              <a:t>cas.war</a:t>
+            </a:r>
+            <a:r>
+              <a:rPr lang="fr-FR" sz="2200" i="0" dirty="0" smtClean="0"/>
+              <a:t> has been </a:t>
+            </a:r>
+            <a:r>
+              <a:rPr lang="fr-FR" sz="2200" i="0" dirty="0" err="1" smtClean="0"/>
+              <a:t>pre-configured</a:t>
+            </a:r>
+            <a:r>
+              <a:rPr lang="fr-FR" sz="2200" i="0" dirty="0" smtClean="0"/>
+              <a:t> to </a:t>
+            </a:r>
+            <a:r>
+              <a:rPr lang="fr-FR" sz="2200" i="0" dirty="0" err="1" smtClean="0"/>
+              <a:t>work</a:t>
+            </a:r>
+            <a:r>
+              <a:rPr lang="fr-FR" sz="2200" i="0" dirty="0" smtClean="0"/>
+              <a:t> </a:t>
+            </a:r>
+            <a:r>
+              <a:rPr lang="fr-FR" sz="2200" i="0" dirty="0" err="1" smtClean="0"/>
+              <a:t>with</a:t>
+            </a:r>
+            <a:r>
+              <a:rPr lang="fr-FR" sz="2200" i="0" dirty="0" smtClean="0"/>
+              <a:t> </a:t>
+            </a:r>
+            <a:r>
+              <a:rPr lang="fr-FR" sz="2200" i="0" dirty="0" err="1" smtClean="0"/>
+              <a:t>eXo</a:t>
+            </a:r>
+            <a:r>
+              <a:rPr lang="fr-FR" sz="2200" i="0" dirty="0" smtClean="0"/>
+              <a:t>, </a:t>
+            </a:r>
+            <a:r>
+              <a:rPr lang="fr-FR" sz="2200" i="0" dirty="0" err="1" smtClean="0"/>
+              <a:t>you</a:t>
+            </a:r>
+            <a:r>
+              <a:rPr lang="fr-FR" sz="2200" i="0" dirty="0" smtClean="0"/>
+              <a:t> </a:t>
+            </a:r>
+            <a:r>
+              <a:rPr lang="fr-FR" sz="2200" i="0" dirty="0" err="1" smtClean="0"/>
+              <a:t>can</a:t>
+            </a:r>
+            <a:r>
+              <a:rPr lang="fr-FR" sz="2200" i="0" dirty="0" smtClean="0"/>
+              <a:t> </a:t>
+            </a:r>
+            <a:r>
+              <a:rPr lang="fr-FR" sz="2200" i="0" dirty="0" err="1" smtClean="0"/>
+              <a:t>find</a:t>
+            </a:r>
+            <a:r>
+              <a:rPr lang="fr-FR" sz="2200" i="0" dirty="0" smtClean="0"/>
+              <a:t> more informations </a:t>
+            </a:r>
+            <a:r>
+              <a:rPr lang="fr-FR" sz="2200" i="0" dirty="0" err="1" smtClean="0"/>
+              <a:t>here</a:t>
+            </a:r>
+            <a:r>
+              <a:rPr lang="fr-FR" sz="2200" i="0" dirty="0" smtClean="0"/>
+              <a:t>:</a:t>
+            </a:r>
+          </a:p>
+          <a:p>
+            <a:pPr>
+              <a:lnSpc>
+                <a:spcPct val="100000"/>
+              </a:lnSpc>
+              <a:buClr>
+                <a:srgbClr val="FF9900"/>
+              </a:buClr>
+              <a:buSzPct val="120000"/>
+              <a:buFont typeface="Lucida Grande"/>
+              <a:buChar char="»"/>
+            </a:pPr>
+            <a:r>
+              <a:rPr lang="fr-FR" sz="2400" b="0" i="0" dirty="0">
+                <a:solidFill>
+                  <a:schemeClr val="tx1">
+                    <a:lumMod val="75000"/>
+                    <a:lumOff val="25000"/>
+                  </a:schemeClr>
+                </a:solidFill>
+                <a:hlinkClick r:id="rId2"/>
+              </a:rPr>
+              <a:t>http://docs.jboss.com/gatein/portal/3.1.0-FINAL/reference-guide/en-US/html_single/index.html#sect-Reference_Guide-Single_Sign_On-</a:t>
+            </a:r>
+            <a:r>
+              <a:rPr lang="fr-FR" sz="2400" b="0" i="0" dirty="0" smtClean="0">
+                <a:solidFill>
+                  <a:schemeClr val="tx1">
+                    <a:lumMod val="75000"/>
+                    <a:lumOff val="25000"/>
+                  </a:schemeClr>
+                </a:solidFill>
+                <a:hlinkClick r:id="rId2"/>
+              </a:rPr>
+              <a:t>CAS_Central_Authentication_Service</a:t>
             </a:r>
             <a:endParaRPr lang="fr-FR" sz="2200" i="0" dirty="0"/>
           </a:p>
@@ -44410,6 +44658,2989 @@
 </file>
 
 <file path=ppt/slides/slide39.xml><?xml version="1.0" encoding="utf-8"?>
+<p:sld xmlns:a="http://schemas.openxmlformats.org/drawingml/2006/main" xmlns:r="http://schemas.openxmlformats.org/officeDocument/2006/relationships" xmlns:p="http://schemas.openxmlformats.org/presentationml/2006/main">
+  <p:cSld>
+    <p:spTree>
+      <p:nvGrpSpPr>
+        <p:cNvPr id="1" name=""/>
+        <p:cNvGrpSpPr/>
+        <p:nvPr/>
+      </p:nvGrpSpPr>
+      <p:grpSpPr>
+        <a:xfrm>
+          <a:off x="0" y="0"/>
+          <a:ext cx="0" cy="0"/>
+          <a:chOff x="0" y="0"/>
+          <a:chExt cx="0" cy="0"/>
+        </a:xfrm>
+      </p:grpSpPr>
+      <p:sp>
+        <p:nvSpPr>
+          <p:cNvPr id="15362" name="Rectangle 1"/>
+          <p:cNvSpPr>
+            <a:spLocks noGrp="1" noChangeArrowheads="1"/>
+          </p:cNvSpPr>
+          <p:nvPr>
+            <p:ph type="title"/>
+          </p:nvPr>
+        </p:nvSpPr>
+        <p:spPr>
+          <a:xfrm>
+            <a:off x="490435" y="255926"/>
+            <a:ext cx="10179255" cy="454024"/>
+          </a:xfrm>
+        </p:spPr>
+        <p:txBody>
+          <a:bodyPr rIns="41783" anchor="b"/>
+          <a:lstStyle/>
+          <a:p>
+            <a:r>
+              <a:rPr lang="fr-FR" dirty="0" err="1" smtClean="0"/>
+              <a:t>Exercise</a:t>
+            </a:r>
+            <a:r>
+              <a:rPr lang="fr-FR" dirty="0" smtClean="0"/>
+              <a:t> 70c : SSO CAS</a:t>
+            </a:r>
+            <a:endParaRPr lang="fr-FR" dirty="0"/>
+          </a:p>
+        </p:txBody>
+      </p:sp>
+      <p:sp>
+        <p:nvSpPr>
+          <p:cNvPr id="15363" name="Rectangle 2"/>
+          <p:cNvSpPr>
+            <a:spLocks noGrp="1" noChangeArrowheads="1"/>
+          </p:cNvSpPr>
+          <p:nvPr>
+            <p:ph type="body" idx="1"/>
+          </p:nvPr>
+        </p:nvSpPr>
+        <p:spPr>
+          <a:xfrm>
+            <a:off x="472905" y="971525"/>
+            <a:ext cx="10219725" cy="5688632"/>
+          </a:xfrm>
+        </p:spPr>
+        <p:txBody>
+          <a:bodyPr rIns="41783" anchor="t"/>
+          <a:lstStyle/>
+          <a:p>
+            <a:pPr>
+              <a:lnSpc>
+                <a:spcPct val="100000"/>
+              </a:lnSpc>
+              <a:buClr>
+                <a:srgbClr val="FF9900"/>
+              </a:buClr>
+              <a:buSzPct val="120000"/>
+              <a:buFont typeface="Lucida Grande"/>
+              <a:buChar char="»"/>
+            </a:pPr>
+            <a:r>
+              <a:rPr lang="fr-CA" sz="2200" i="0" dirty="0" err="1"/>
+              <a:t>E</a:t>
+            </a:r>
+            <a:r>
+              <a:rPr lang="fr-CA" sz="2200" i="0" dirty="0" err="1" smtClean="0"/>
+              <a:t>dit</a:t>
+            </a:r>
+            <a:r>
+              <a:rPr lang="fr-CA" sz="2200" i="0" dirty="0" smtClean="0"/>
+              <a:t> </a:t>
+            </a:r>
+            <a:r>
+              <a:rPr lang="fr-CA" sz="2200" i="0" dirty="0"/>
+              <a:t>the </a:t>
+            </a:r>
+            <a:r>
+              <a:rPr lang="fr-CA" sz="2200" i="0" dirty="0" err="1"/>
+              <a:t>server.xml</a:t>
+            </a:r>
+            <a:r>
+              <a:rPr lang="fr-CA" sz="2200" i="0" dirty="0"/>
+              <a:t> file in </a:t>
+            </a:r>
+            <a:r>
+              <a:rPr lang="fr-CA" sz="2200" i="0" dirty="0" err="1"/>
+              <a:t>tomcat</a:t>
+            </a:r>
+            <a:r>
+              <a:rPr lang="fr-CA" sz="2200" i="0" dirty="0"/>
+              <a:t> and </a:t>
+            </a:r>
+            <a:r>
+              <a:rPr lang="fr-CA" sz="2200" i="0" dirty="0" err="1"/>
+              <a:t>uncomment</a:t>
+            </a:r>
+            <a:r>
+              <a:rPr lang="fr-CA" sz="2200" i="0" dirty="0"/>
+              <a:t> the SSL section to open up port 8443.</a:t>
+            </a:r>
+          </a:p>
+          <a:p>
+            <a:pPr marL="3175" indent="0">
+              <a:lnSpc>
+                <a:spcPct val="50000"/>
+              </a:lnSpc>
+              <a:buNone/>
+            </a:pPr>
+            <a:r>
+              <a:rPr lang="fr-CA" sz="1200" b="0" i="0" dirty="0" smtClean="0"/>
+              <a:t>	&lt;</a:t>
+            </a:r>
+            <a:r>
+              <a:rPr lang="fr-CA" sz="1200" b="0" i="0" dirty="0"/>
+              <a:t>!-- </a:t>
+            </a:r>
+            <a:r>
+              <a:rPr lang="fr-CA" sz="1200" b="0" i="0" dirty="0" err="1"/>
+              <a:t>Define</a:t>
+            </a:r>
+            <a:r>
+              <a:rPr lang="fr-CA" sz="1200" b="0" i="0" dirty="0"/>
+              <a:t> a SSL HTTP/1.1 </a:t>
+            </a:r>
+            <a:r>
+              <a:rPr lang="fr-CA" sz="1200" b="0" i="0" dirty="0" err="1"/>
+              <a:t>Connector</a:t>
+            </a:r>
+            <a:r>
+              <a:rPr lang="fr-CA" sz="1200" b="0" i="0" dirty="0"/>
+              <a:t> on port 8443 --&gt;</a:t>
+            </a:r>
+          </a:p>
+          <a:p>
+            <a:pPr marL="3175" indent="0">
+              <a:lnSpc>
+                <a:spcPct val="50000"/>
+              </a:lnSpc>
+              <a:buNone/>
+            </a:pPr>
+            <a:r>
+              <a:rPr lang="fr-CA" sz="1200" b="0" i="0" dirty="0" smtClean="0"/>
+              <a:t>	&lt;</a:t>
+            </a:r>
+            <a:r>
+              <a:rPr lang="fr-CA" sz="1200" b="0" i="0" dirty="0" err="1"/>
+              <a:t>Connector</a:t>
+            </a:r>
+            <a:r>
+              <a:rPr lang="fr-CA" sz="1200" b="0" i="0" dirty="0"/>
+              <a:t> port="8443" </a:t>
+            </a:r>
+            <a:r>
+              <a:rPr lang="fr-CA" sz="1200" b="0" i="0" dirty="0" err="1"/>
+              <a:t>maxHttpHeaderSize</a:t>
+            </a:r>
+            <a:r>
+              <a:rPr lang="fr-CA" sz="1200" b="0" i="0" dirty="0"/>
+              <a:t>="8192"</a:t>
+            </a:r>
+          </a:p>
+          <a:p>
+            <a:pPr marL="3175" indent="0">
+              <a:lnSpc>
+                <a:spcPct val="50000"/>
+              </a:lnSpc>
+              <a:buNone/>
+            </a:pPr>
+            <a:r>
+              <a:rPr lang="fr-CA" sz="1200" b="0" i="0" dirty="0" smtClean="0"/>
+              <a:t>	</a:t>
+            </a:r>
+            <a:r>
+              <a:rPr lang="fr-CA" sz="1200" b="0" i="0" dirty="0" err="1" smtClean="0"/>
+              <a:t>maxThreads</a:t>
+            </a:r>
+            <a:r>
+              <a:rPr lang="fr-CA" sz="1200" b="0" i="0" dirty="0"/>
+              <a:t>="150" </a:t>
+            </a:r>
+            <a:r>
+              <a:rPr lang="fr-CA" sz="1200" b="0" i="0" dirty="0" err="1"/>
+              <a:t>minSpareThreads</a:t>
+            </a:r>
+            <a:r>
+              <a:rPr lang="fr-CA" sz="1200" b="0" i="0" dirty="0"/>
+              <a:t>="25" </a:t>
+            </a:r>
+            <a:r>
+              <a:rPr lang="fr-CA" sz="1200" b="0" i="0" dirty="0" err="1"/>
+              <a:t>maxSpareThreads</a:t>
+            </a:r>
+            <a:r>
+              <a:rPr lang="fr-CA" sz="1200" b="0" i="0" dirty="0"/>
+              <a:t>="75"</a:t>
+            </a:r>
+          </a:p>
+          <a:p>
+            <a:pPr marL="3175" indent="0">
+              <a:lnSpc>
+                <a:spcPct val="50000"/>
+              </a:lnSpc>
+              <a:buNone/>
+            </a:pPr>
+            <a:r>
+              <a:rPr lang="fr-CA" sz="1200" b="0" i="0" dirty="0" smtClean="0"/>
+              <a:t>	</a:t>
+            </a:r>
+            <a:r>
+              <a:rPr lang="fr-CA" sz="1200" b="0" i="0" dirty="0" err="1" smtClean="0"/>
+              <a:t>enableLookups</a:t>
+            </a:r>
+            <a:r>
+              <a:rPr lang="fr-CA" sz="1200" b="0" i="0" dirty="0"/>
+              <a:t>="false" </a:t>
+            </a:r>
+            <a:r>
+              <a:rPr lang="fr-CA" sz="1200" b="0" i="0" dirty="0" err="1"/>
+              <a:t>disableUploadTimeout</a:t>
+            </a:r>
+            <a:r>
+              <a:rPr lang="fr-CA" sz="1200" b="0" i="0" dirty="0"/>
+              <a:t>="</a:t>
+            </a:r>
+            <a:r>
+              <a:rPr lang="fr-CA" sz="1200" b="0" i="0" dirty="0" err="1" smtClean="0"/>
+              <a:t>true</a:t>
+            </a:r>
+            <a:r>
+              <a:rPr lang="fr-CA" sz="1200" b="0" i="0" dirty="0" smtClean="0"/>
+              <a:t>" </a:t>
+            </a:r>
+            <a:r>
+              <a:rPr lang="fr-CA" sz="1200" b="0" i="0" dirty="0" err="1" smtClean="0"/>
+              <a:t>acceptCount</a:t>
+            </a:r>
+            <a:r>
+              <a:rPr lang="fr-CA" sz="1200" b="0" i="0" dirty="0" smtClean="0"/>
+              <a:t>="100" </a:t>
+            </a:r>
+            <a:r>
+              <a:rPr lang="fr-CA" sz="1200" b="0" i="0" dirty="0" err="1" smtClean="0"/>
+              <a:t>scheme</a:t>
+            </a:r>
+            <a:r>
+              <a:rPr lang="fr-CA" sz="1200" b="0" i="0" dirty="0" smtClean="0"/>
+              <a:t>="</a:t>
+            </a:r>
+            <a:r>
+              <a:rPr lang="fr-CA" sz="1200" b="0" i="0" dirty="0" err="1" smtClean="0"/>
+              <a:t>https</a:t>
+            </a:r>
+            <a:r>
+              <a:rPr lang="fr-CA" sz="1200" b="0" i="0" dirty="0" smtClean="0"/>
+              <a:t>" </a:t>
+            </a:r>
+          </a:p>
+          <a:p>
+            <a:pPr marL="3175" indent="0">
+              <a:lnSpc>
+                <a:spcPct val="50000"/>
+              </a:lnSpc>
+              <a:buNone/>
+            </a:pPr>
+            <a:r>
+              <a:rPr lang="fr-CA" sz="1200" b="0" i="0" dirty="0"/>
+              <a:t>	</a:t>
+            </a:r>
+            <a:r>
+              <a:rPr lang="fr-CA" sz="1200" b="0" i="0" dirty="0" err="1" smtClean="0"/>
+              <a:t>secure</a:t>
+            </a:r>
+            <a:r>
+              <a:rPr lang="fr-CA" sz="1200" b="0" i="0" dirty="0" smtClean="0"/>
+              <a:t>="</a:t>
+            </a:r>
+            <a:r>
+              <a:rPr lang="fr-CA" sz="1200" b="0" i="0" dirty="0" err="1" smtClean="0"/>
+              <a:t>true</a:t>
+            </a:r>
+            <a:r>
+              <a:rPr lang="fr-CA" sz="1200" b="0" i="0" dirty="0" smtClean="0"/>
+              <a:t>" </a:t>
+            </a:r>
+            <a:r>
+              <a:rPr lang="fr-CA" sz="1200" b="0" i="0" dirty="0" err="1" smtClean="0"/>
+              <a:t>clientAuth</a:t>
+            </a:r>
+            <a:r>
+              <a:rPr lang="fr-CA" sz="1200" b="0" i="0" dirty="0"/>
+              <a:t>="false" </a:t>
+            </a:r>
+            <a:r>
+              <a:rPr lang="fr-CA" sz="1200" b="0" i="0" dirty="0" err="1"/>
+              <a:t>sslProtocol</a:t>
+            </a:r>
+            <a:r>
+              <a:rPr lang="fr-CA" sz="1200" b="0" i="0" dirty="0"/>
+              <a:t>="TLS" /</a:t>
+            </a:r>
+            <a:r>
+              <a:rPr lang="fr-CA" sz="1200" b="0" i="0" dirty="0" smtClean="0"/>
+              <a:t>&gt;</a:t>
+            </a:r>
+            <a:endParaRPr lang="fr-CA" sz="1200" b="0" i="0" dirty="0"/>
+          </a:p>
+          <a:p>
+            <a:pPr>
+              <a:lnSpc>
+                <a:spcPct val="100000"/>
+              </a:lnSpc>
+              <a:buClr>
+                <a:srgbClr val="FF9900"/>
+              </a:buClr>
+              <a:buSzPct val="120000"/>
+              <a:buFont typeface="Lucida Grande"/>
+              <a:buChar char="»"/>
+            </a:pPr>
+            <a:r>
+              <a:rPr lang="fr-FR" sz="2200" i="0" dirty="0" err="1"/>
+              <a:t>Now</a:t>
+            </a:r>
+            <a:r>
+              <a:rPr lang="fr-FR" sz="2200" i="0" dirty="0"/>
+              <a:t>, </a:t>
+            </a:r>
+            <a:r>
+              <a:rPr lang="fr-FR" sz="2200" i="0" dirty="0" err="1"/>
+              <a:t>we</a:t>
+            </a:r>
+            <a:r>
+              <a:rPr lang="fr-FR" sz="2200" i="0" dirty="0"/>
+              <a:t> </a:t>
+            </a:r>
+            <a:r>
+              <a:rPr lang="fr-FR" sz="2200" i="0" dirty="0" err="1"/>
+              <a:t>will</a:t>
+            </a:r>
+            <a:r>
+              <a:rPr lang="fr-FR" sz="2200" i="0" dirty="0"/>
+              <a:t> setup the </a:t>
+            </a:r>
+            <a:r>
+              <a:rPr lang="fr-FR" sz="2200" i="0" dirty="0" smtClean="0"/>
+              <a:t>client</a:t>
+            </a:r>
+          </a:p>
+          <a:p>
+            <a:pPr>
+              <a:lnSpc>
+                <a:spcPct val="100000"/>
+              </a:lnSpc>
+              <a:buClr>
+                <a:srgbClr val="FF9900"/>
+              </a:buClr>
+              <a:buSzPct val="120000"/>
+              <a:buFont typeface="Lucida Grande"/>
+              <a:buChar char="»"/>
+            </a:pPr>
+            <a:r>
+              <a:rPr lang="fr-CA" sz="2200" i="0" dirty="0" err="1" smtClean="0"/>
+              <a:t>Generate</a:t>
+            </a:r>
+            <a:r>
+              <a:rPr lang="fr-CA" sz="2200" i="0" dirty="0" smtClean="0"/>
+              <a:t> </a:t>
+            </a:r>
+            <a:r>
+              <a:rPr lang="fr-CA" sz="2200" i="0" dirty="0"/>
+              <a:t>the SSL </a:t>
+            </a:r>
+            <a:r>
+              <a:rPr lang="fr-CA" sz="2200" i="0" dirty="0" err="1"/>
+              <a:t>cert</a:t>
+            </a:r>
+            <a:r>
+              <a:rPr lang="fr-CA" sz="2200" i="0" dirty="0"/>
+              <a:t> </a:t>
+            </a:r>
+            <a:r>
+              <a:rPr lang="fr-CA" sz="2200" i="0" dirty="0" err="1"/>
+              <a:t>with</a:t>
+            </a:r>
+            <a:r>
+              <a:rPr lang="fr-CA" sz="2200" i="0" dirty="0"/>
+              <a:t> Java </a:t>
+            </a:r>
+            <a:r>
+              <a:rPr lang="fr-CA" sz="2200" i="0" dirty="0" err="1" smtClean="0"/>
+              <a:t>keytool</a:t>
+            </a:r>
+            <a:r>
+              <a:rPr lang="fr-CA" sz="2200" i="0" dirty="0" smtClean="0"/>
+              <a:t> (</a:t>
+            </a:r>
+            <a:r>
+              <a:rPr lang="fr-CA" sz="2200" i="0" dirty="0" err="1"/>
+              <a:t>Answer</a:t>
+            </a:r>
+            <a:r>
+              <a:rPr lang="fr-CA" sz="2200" i="0" dirty="0"/>
+              <a:t> the questions: </a:t>
+            </a:r>
+            <a:r>
+              <a:rPr lang="fr-CA" sz="2200" i="0" dirty="0" err="1" smtClean="0"/>
+              <a:t>your</a:t>
+            </a:r>
+            <a:r>
+              <a:rPr lang="fr-CA" sz="2200" i="0" dirty="0" smtClean="0"/>
+              <a:t> </a:t>
+            </a:r>
+            <a:r>
+              <a:rPr lang="fr-CA" sz="2200" i="0" dirty="0" err="1"/>
+              <a:t>firstname</a:t>
+            </a:r>
+            <a:r>
+              <a:rPr lang="fr-CA" sz="2200" i="0" dirty="0"/>
+              <a:t> and </a:t>
+            </a:r>
+            <a:r>
+              <a:rPr lang="fr-CA" sz="2200" i="0" dirty="0" err="1"/>
+              <a:t>lastname</a:t>
+            </a:r>
+            <a:r>
+              <a:rPr lang="fr-CA" sz="2200" i="0" dirty="0"/>
+              <a:t> MUST </a:t>
+            </a:r>
+            <a:r>
+              <a:rPr lang="fr-CA" sz="2200" i="0" dirty="0" err="1"/>
+              <a:t>be</a:t>
+            </a:r>
+            <a:r>
+              <a:rPr lang="fr-CA" sz="2200" i="0" dirty="0"/>
+              <a:t> </a:t>
+            </a:r>
+            <a:r>
+              <a:rPr lang="fr-CA" sz="2200" i="0" dirty="0" err="1"/>
+              <a:t>hostname</a:t>
+            </a:r>
+            <a:r>
+              <a:rPr lang="fr-CA" sz="2200" i="0" dirty="0"/>
+              <a:t> </a:t>
+            </a:r>
+            <a:r>
+              <a:rPr lang="fr-CA" sz="2200" i="0" dirty="0" smtClean="0"/>
+              <a:t>(</a:t>
+            </a:r>
+            <a:r>
+              <a:rPr lang="fr-CA" sz="2200" i="0" dirty="0" err="1" smtClean="0"/>
+              <a:t>localhost</a:t>
+            </a:r>
+            <a:r>
+              <a:rPr lang="fr-CA" sz="2200" i="0" dirty="0" smtClean="0"/>
+              <a:t> for </a:t>
+            </a:r>
+            <a:r>
+              <a:rPr lang="fr-CA" sz="2200" i="0" dirty="0" err="1" smtClean="0"/>
+              <a:t>testing</a:t>
+            </a:r>
+            <a:r>
+              <a:rPr lang="fr-CA" sz="2200" i="0" dirty="0" smtClean="0"/>
+              <a:t>) of </a:t>
+            </a:r>
+            <a:r>
+              <a:rPr lang="fr-CA" sz="2200" i="0" dirty="0" err="1"/>
+              <a:t>your</a:t>
+            </a:r>
+            <a:r>
+              <a:rPr lang="fr-CA" sz="2200" i="0" dirty="0"/>
+              <a:t> server and </a:t>
+            </a:r>
+            <a:r>
+              <a:rPr lang="fr-CA" sz="2200" i="0" dirty="0" err="1"/>
+              <a:t>cannot</a:t>
+            </a:r>
+            <a:r>
+              <a:rPr lang="fr-CA" sz="2200" i="0" dirty="0"/>
+              <a:t> </a:t>
+            </a:r>
+            <a:r>
+              <a:rPr lang="fr-CA" sz="2200" i="0" dirty="0" err="1"/>
+              <a:t>be</a:t>
+            </a:r>
+            <a:r>
+              <a:rPr lang="fr-CA" sz="2200" i="0" dirty="0"/>
+              <a:t> a IP </a:t>
+            </a:r>
+            <a:r>
+              <a:rPr lang="fr-CA" sz="2200" i="0" dirty="0" err="1" smtClean="0"/>
+              <a:t>address</a:t>
+            </a:r>
+            <a:r>
+              <a:rPr lang="fr-CA" sz="2200" i="0" dirty="0" smtClean="0"/>
+              <a:t>):</a:t>
+            </a:r>
+          </a:p>
+          <a:p>
+            <a:pPr marL="3175" indent="0">
+              <a:lnSpc>
+                <a:spcPct val="100000"/>
+              </a:lnSpc>
+              <a:buClr>
+                <a:srgbClr val="FF9900"/>
+              </a:buClr>
+              <a:buSzPct val="120000"/>
+              <a:buNone/>
+            </a:pPr>
+            <a:r>
+              <a:rPr lang="fr-CA" sz="1800" b="0" i="0" dirty="0" err="1" smtClean="0"/>
+              <a:t>keytool</a:t>
+            </a:r>
+            <a:r>
+              <a:rPr lang="fr-CA" sz="1800" b="0" i="0" dirty="0" smtClean="0"/>
+              <a:t> </a:t>
+            </a:r>
+            <a:r>
+              <a:rPr lang="fr-CA" sz="1800" b="0" i="0" dirty="0"/>
+              <a:t>-</a:t>
+            </a:r>
+            <a:r>
+              <a:rPr lang="fr-CA" sz="1800" b="0" i="0" dirty="0" err="1"/>
+              <a:t>genkey</a:t>
+            </a:r>
+            <a:r>
+              <a:rPr lang="fr-CA" sz="1800" b="0" i="0" dirty="0"/>
+              <a:t> -alias </a:t>
+            </a:r>
+            <a:r>
+              <a:rPr lang="fr-CA" sz="1800" b="0" i="0" dirty="0" err="1"/>
+              <a:t>tomcat</a:t>
+            </a:r>
+            <a:r>
+              <a:rPr lang="fr-CA" sz="1800" b="0" i="0" dirty="0"/>
+              <a:t> -</a:t>
+            </a:r>
+            <a:r>
+              <a:rPr lang="fr-CA" sz="1800" b="0" i="0" dirty="0" err="1"/>
+              <a:t>keypass</a:t>
+            </a:r>
+            <a:r>
+              <a:rPr lang="fr-CA" sz="1800" b="0" i="0" dirty="0"/>
+              <a:t> </a:t>
+            </a:r>
+            <a:r>
+              <a:rPr lang="fr-CA" sz="1800" b="0" i="0" dirty="0" err="1"/>
+              <a:t>changeit</a:t>
+            </a:r>
+            <a:r>
+              <a:rPr lang="fr-CA" sz="1800" b="0" i="0" dirty="0"/>
+              <a:t> -</a:t>
+            </a:r>
+            <a:r>
+              <a:rPr lang="fr-CA" sz="1800" b="0" i="0" dirty="0" err="1"/>
+              <a:t>keyalg</a:t>
+            </a:r>
+            <a:r>
+              <a:rPr lang="fr-CA" sz="1800" b="0" i="0" dirty="0"/>
+              <a:t> </a:t>
+            </a:r>
+            <a:r>
+              <a:rPr lang="fr-CA" sz="1800" b="0" i="0" dirty="0" smtClean="0"/>
+              <a:t>RSA</a:t>
+            </a:r>
+          </a:p>
+          <a:p>
+            <a:pPr>
+              <a:lnSpc>
+                <a:spcPct val="100000"/>
+              </a:lnSpc>
+              <a:buClr>
+                <a:srgbClr val="FF9900"/>
+              </a:buClr>
+              <a:buSzPct val="120000"/>
+              <a:buFont typeface="Lucida Grande"/>
+              <a:buChar char="»"/>
+            </a:pPr>
+            <a:r>
+              <a:rPr lang="fr-CA" sz="2200" i="0" dirty="0" smtClean="0"/>
+              <a:t>Export </a:t>
+            </a:r>
+            <a:r>
+              <a:rPr lang="fr-CA" sz="2200" i="0" dirty="0" err="1" smtClean="0"/>
+              <a:t>it</a:t>
+            </a:r>
+            <a:r>
+              <a:rPr lang="fr-CA" sz="2200" i="0" dirty="0" smtClean="0"/>
+              <a:t> : </a:t>
+            </a:r>
+            <a:r>
+              <a:rPr lang="fr-CA" sz="1800" b="0" i="0" dirty="0" err="1" smtClean="0"/>
+              <a:t>keytool</a:t>
+            </a:r>
+            <a:r>
+              <a:rPr lang="fr-CA" sz="1800" b="0" i="0" dirty="0" smtClean="0"/>
+              <a:t> </a:t>
+            </a:r>
+            <a:r>
+              <a:rPr lang="fr-CA" sz="1800" b="0" i="0" dirty="0"/>
+              <a:t>-export -alias </a:t>
+            </a:r>
+            <a:r>
+              <a:rPr lang="fr-CA" sz="1800" b="0" i="0" dirty="0" err="1"/>
+              <a:t>tomcat</a:t>
+            </a:r>
+            <a:r>
+              <a:rPr lang="fr-CA" sz="1800" b="0" i="0" dirty="0"/>
+              <a:t> -</a:t>
+            </a:r>
+            <a:r>
+              <a:rPr lang="fr-CA" sz="1800" b="0" i="0" dirty="0" err="1"/>
+              <a:t>keypass</a:t>
+            </a:r>
+            <a:r>
+              <a:rPr lang="fr-CA" sz="1800" b="0" i="0" dirty="0"/>
+              <a:t> </a:t>
+            </a:r>
+            <a:r>
+              <a:rPr lang="fr-CA" sz="1800" b="0" i="0" dirty="0" err="1"/>
+              <a:t>changeit</a:t>
+            </a:r>
+            <a:r>
+              <a:rPr lang="fr-CA" sz="1800" b="0" i="0" dirty="0"/>
+              <a:t> -file %FILE_NAME</a:t>
+            </a:r>
+            <a:r>
+              <a:rPr lang="fr-CA" sz="1800" b="0" i="0" dirty="0" smtClean="0"/>
+              <a:t>%</a:t>
+            </a:r>
+            <a:endParaRPr lang="fr-CA" sz="1800" dirty="0"/>
+          </a:p>
+          <a:p>
+            <a:pPr>
+              <a:lnSpc>
+                <a:spcPct val="100000"/>
+              </a:lnSpc>
+              <a:buClr>
+                <a:srgbClr val="FF9900"/>
+              </a:buClr>
+              <a:buSzPct val="120000"/>
+              <a:buFont typeface="Lucida Grande"/>
+              <a:buChar char="»"/>
+            </a:pPr>
+            <a:r>
+              <a:rPr lang="fr-CA" sz="2200" i="0" dirty="0" err="1"/>
+              <a:t>Finally</a:t>
+            </a:r>
+            <a:r>
+              <a:rPr lang="fr-CA" sz="2200" i="0" dirty="0"/>
+              <a:t> import the </a:t>
+            </a:r>
+            <a:r>
+              <a:rPr lang="fr-CA" sz="2200" i="0" dirty="0" err="1"/>
+              <a:t>cert</a:t>
+            </a:r>
+            <a:r>
+              <a:rPr lang="fr-CA" sz="2200" i="0" dirty="0"/>
+              <a:t> </a:t>
+            </a:r>
+            <a:r>
+              <a:rPr lang="fr-CA" sz="2200" i="0" dirty="0" err="1"/>
+              <a:t>into</a:t>
+            </a:r>
+            <a:r>
+              <a:rPr lang="fr-CA" sz="2200" i="0" dirty="0"/>
+              <a:t> </a:t>
+            </a:r>
+            <a:r>
+              <a:rPr lang="fr-CA" sz="2200" i="0" dirty="0" err="1"/>
+              <a:t>Java's</a:t>
+            </a:r>
+            <a:r>
+              <a:rPr lang="fr-CA" sz="2200" i="0" dirty="0"/>
+              <a:t> </a:t>
+            </a:r>
+            <a:r>
+              <a:rPr lang="fr-CA" sz="2200" i="0" dirty="0" err="1" smtClean="0"/>
+              <a:t>keystore</a:t>
+            </a:r>
+            <a:r>
+              <a:rPr lang="fr-CA" sz="2200" i="0" dirty="0" smtClean="0"/>
+              <a:t> </a:t>
+            </a:r>
+            <a:r>
+              <a:rPr lang="fr-CA" sz="1800" dirty="0" smtClean="0"/>
+              <a:t>:</a:t>
+            </a:r>
+            <a:r>
+              <a:rPr lang="fr-CA" sz="1800" dirty="0"/>
+              <a:t>	 </a:t>
+            </a:r>
+            <a:r>
+              <a:rPr lang="fr-CA" sz="1800" b="0" i="0" dirty="0" err="1" smtClean="0"/>
+              <a:t>keytool</a:t>
+            </a:r>
+            <a:r>
+              <a:rPr lang="fr-CA" sz="1800" b="0" i="0" dirty="0" smtClean="0"/>
+              <a:t> </a:t>
+            </a:r>
+            <a:r>
+              <a:rPr lang="fr-CA" sz="1800" b="0" i="0" dirty="0"/>
+              <a:t>-import -alias </a:t>
+            </a:r>
+            <a:r>
+              <a:rPr lang="fr-CA" sz="1800" b="0" i="0" dirty="0" err="1"/>
+              <a:t>tomcat</a:t>
+            </a:r>
+            <a:r>
+              <a:rPr lang="fr-CA" sz="1800" b="0" i="0" dirty="0"/>
+              <a:t> -file %FILE_NAME% -</a:t>
+            </a:r>
+            <a:r>
+              <a:rPr lang="fr-CA" sz="1800" b="0" i="0" dirty="0" err="1"/>
+              <a:t>keypass</a:t>
+            </a:r>
+            <a:r>
+              <a:rPr lang="fr-CA" sz="1800" b="0" i="0" dirty="0"/>
+              <a:t> </a:t>
+            </a:r>
+            <a:r>
+              <a:rPr lang="fr-CA" sz="1800" b="0" i="0" dirty="0" err="1"/>
+              <a:t>changeit</a:t>
+            </a:r>
+            <a:r>
+              <a:rPr lang="fr-CA" sz="1800" b="0" i="0" dirty="0"/>
+              <a:t> -</a:t>
+            </a:r>
+            <a:r>
+              <a:rPr lang="fr-CA" sz="1800" b="0" i="0" dirty="0" err="1"/>
+              <a:t>keystore</a:t>
+            </a:r>
+            <a:r>
+              <a:rPr lang="fr-CA" sz="1800" b="0" i="0" dirty="0"/>
+              <a:t> %JAVA_HOME%/</a:t>
+            </a:r>
+            <a:r>
+              <a:rPr lang="fr-CA" sz="1800" b="0" i="0" dirty="0" err="1"/>
+              <a:t>jre</a:t>
+            </a:r>
+            <a:r>
+              <a:rPr lang="fr-CA" sz="1800" b="0" i="0" dirty="0"/>
+              <a:t>/lib/</a:t>
+            </a:r>
+            <a:r>
+              <a:rPr lang="fr-CA" sz="1800" b="0" i="0" dirty="0" err="1"/>
+              <a:t>security</a:t>
+            </a:r>
+            <a:r>
+              <a:rPr lang="fr-CA" sz="1800" b="0" i="0" dirty="0"/>
+              <a:t>/</a:t>
+            </a:r>
+            <a:r>
+              <a:rPr lang="fr-CA" sz="1800" b="0" i="0" dirty="0" err="1"/>
+              <a:t>cacerts</a:t>
+            </a:r>
+            <a:endParaRPr lang="fr-FR" sz="1800" b="0" i="0" dirty="0" smtClean="0">
+              <a:solidFill>
+                <a:schemeClr val="tx1">
+                  <a:lumMod val="75000"/>
+                  <a:lumOff val="25000"/>
+                </a:schemeClr>
+              </a:solidFill>
+            </a:endParaRPr>
+          </a:p>
+          <a:p>
+            <a:pPr>
+              <a:lnSpc>
+                <a:spcPct val="100000"/>
+              </a:lnSpc>
+              <a:buClr>
+                <a:srgbClr val="FF9900"/>
+              </a:buClr>
+              <a:buSzPct val="120000"/>
+              <a:buFont typeface="Lucida Grande"/>
+              <a:buChar char="»"/>
+            </a:pPr>
+            <a:endParaRPr lang="fr-FR" sz="1800" b="0" i="0" dirty="0">
+              <a:solidFill>
+                <a:schemeClr val="tx1">
+                  <a:lumMod val="75000"/>
+                  <a:lumOff val="25000"/>
+                </a:schemeClr>
+              </a:solidFill>
+            </a:endParaRPr>
+          </a:p>
+          <a:p>
+            <a:pPr>
+              <a:lnSpc>
+                <a:spcPct val="100000"/>
+              </a:lnSpc>
+              <a:buClr>
+                <a:srgbClr val="FF9900"/>
+              </a:buClr>
+              <a:buSzPct val="120000"/>
+              <a:buFont typeface="Lucida Grande"/>
+              <a:buChar char="»"/>
+            </a:pPr>
+            <a:endParaRPr lang="fr-FR" sz="1800" i="0" dirty="0">
+              <a:solidFill>
+                <a:schemeClr val="tx1">
+                  <a:lumMod val="75000"/>
+                  <a:lumOff val="25000"/>
+                </a:schemeClr>
+              </a:solidFill>
+            </a:endParaRPr>
+          </a:p>
+          <a:p>
+            <a:pPr>
+              <a:lnSpc>
+                <a:spcPct val="100000"/>
+              </a:lnSpc>
+              <a:buClr>
+                <a:srgbClr val="FF9900"/>
+              </a:buClr>
+              <a:buSzPct val="120000"/>
+              <a:buFont typeface="Lucida Grande"/>
+              <a:buChar char="»"/>
+            </a:pPr>
+            <a:endParaRPr lang="fr-FR" sz="1800" i="0" dirty="0">
+              <a:solidFill>
+                <a:schemeClr val="tx1">
+                  <a:lumMod val="75000"/>
+                  <a:lumOff val="25000"/>
+                </a:schemeClr>
+              </a:solidFill>
+            </a:endParaRPr>
+          </a:p>
+        </p:txBody>
+      </p:sp>
+    </p:spTree>
+    <p:extLst>
+      <p:ext uri="{BB962C8B-B14F-4D97-AF65-F5344CB8AC3E}">
+        <p14:creationId xmlns:p14="http://schemas.microsoft.com/office/powerpoint/2010/main" val="192447714"/>
+      </p:ext>
+    </p:extLst>
+  </p:cSld>
+  <p:clrMapOvr>
+    <a:masterClrMapping/>
+  </p:clrMapOvr>
+  <p:transition xmlns:p14="http://schemas.microsoft.com/office/powerpoint/2010/main"/>
+  <p:timing>
+    <p:tnLst>
+      <p:par>
+        <p:cTn xmlns:p14="http://schemas.microsoft.com/office/powerpoint/2010/main" id="1" dur="indefinite" restart="never" nodeType="tmRoot"/>
+      </p:par>
+    </p:tnLst>
+  </p:timing>
+</p:sld>
+</file>
+
+<file path=ppt/slides/slide4.xml><?xml version="1.0" encoding="utf-8"?>
+<p:sld xmlns:a="http://schemas.openxmlformats.org/drawingml/2006/main" xmlns:r="http://schemas.openxmlformats.org/officeDocument/2006/relationships" xmlns:p="http://schemas.openxmlformats.org/presentationml/2006/main">
+  <p:cSld>
+    <p:spTree>
+      <p:nvGrpSpPr>
+        <p:cNvPr id="1" name=""/>
+        <p:cNvGrpSpPr/>
+        <p:nvPr/>
+      </p:nvGrpSpPr>
+      <p:grpSpPr>
+        <a:xfrm>
+          <a:off x="0" y="0"/>
+          <a:ext cx="0" cy="0"/>
+          <a:chOff x="0" y="0"/>
+          <a:chExt cx="0" cy="0"/>
+        </a:xfrm>
+      </p:grpSpPr>
+      <p:sp>
+        <p:nvSpPr>
+          <p:cNvPr id="15362" name="Rectangle 1"/>
+          <p:cNvSpPr>
+            <a:spLocks noGrp="1" noChangeArrowheads="1"/>
+          </p:cNvSpPr>
+          <p:nvPr>
+            <p:ph type="title"/>
+          </p:nvPr>
+        </p:nvSpPr>
+        <p:spPr>
+          <a:xfrm>
+            <a:off x="490435" y="255926"/>
+            <a:ext cx="10179255" cy="454024"/>
+          </a:xfrm>
+        </p:spPr>
+        <p:txBody>
+          <a:bodyPr rIns="41783" anchor="b"/>
+          <a:lstStyle/>
+          <a:p>
+            <a:r>
+              <a:rPr lang="fr-FR" dirty="0" err="1"/>
+              <a:t>Overview</a:t>
+            </a:r>
+            <a:r>
+              <a:rPr lang="fr-FR" dirty="0"/>
+              <a:t> of the </a:t>
+            </a:r>
+            <a:r>
+              <a:rPr lang="fr-FR" dirty="0" err="1"/>
+              <a:t>Organizational</a:t>
+            </a:r>
+            <a:r>
+              <a:rPr lang="fr-FR" dirty="0"/>
+              <a:t> Model</a:t>
+            </a:r>
+          </a:p>
+        </p:txBody>
+      </p:sp>
+      <p:sp>
+        <p:nvSpPr>
+          <p:cNvPr id="15363" name="Rectangle 2"/>
+          <p:cNvSpPr>
+            <a:spLocks noGrp="1" noChangeArrowheads="1"/>
+          </p:cNvSpPr>
+          <p:nvPr>
+            <p:ph type="body" idx="1"/>
+          </p:nvPr>
+        </p:nvSpPr>
+        <p:spPr>
+          <a:xfrm>
+            <a:off x="467494" y="1350945"/>
+            <a:ext cx="10219725" cy="5089000"/>
+          </a:xfrm>
+        </p:spPr>
+        <p:txBody>
+          <a:bodyPr rIns="41783" anchor="t"/>
+          <a:lstStyle/>
+          <a:p>
+            <a:pPr marL="265113" lvl="1" indent="-265113">
+              <a:lnSpc>
+                <a:spcPct val="100000"/>
+              </a:lnSpc>
+            </a:pPr>
+            <a:r>
+              <a:rPr lang="fr-FR" i="0" dirty="0" smtClean="0">
+                <a:solidFill>
+                  <a:schemeClr val="tx1">
+                    <a:lumMod val="75000"/>
+                    <a:lumOff val="25000"/>
+                  </a:schemeClr>
+                </a:solidFill>
+              </a:rPr>
+              <a:t>User </a:t>
+            </a:r>
+            <a:endParaRPr lang="fr-FR" i="0" dirty="0">
+              <a:solidFill>
+                <a:schemeClr val="tx1">
+                  <a:lumMod val="75000"/>
+                  <a:lumOff val="25000"/>
+                </a:schemeClr>
+              </a:solidFill>
+            </a:endParaRPr>
+          </a:p>
+          <a:p>
+            <a:pPr marL="3175" indent="0">
+              <a:buNone/>
+            </a:pPr>
+            <a:r>
+              <a:rPr lang="fr-FR" sz="2200" i="0" dirty="0" smtClean="0">
+                <a:solidFill>
+                  <a:schemeClr val="tx1">
+                    <a:lumMod val="75000"/>
+                    <a:lumOff val="25000"/>
+                  </a:schemeClr>
+                </a:solidFill>
+              </a:rPr>
+              <a:t>	- </a:t>
+            </a:r>
+            <a:r>
+              <a:rPr lang="fr-FR" sz="2200" i="0" dirty="0" err="1">
+                <a:solidFill>
+                  <a:schemeClr val="tx1">
+                    <a:lumMod val="75000"/>
+                    <a:lumOff val="25000"/>
+                  </a:schemeClr>
+                </a:solidFill>
+              </a:rPr>
+              <a:t>Username</a:t>
+            </a:r>
+            <a:r>
+              <a:rPr lang="fr-FR" sz="2200" i="0" dirty="0">
+                <a:solidFill>
+                  <a:schemeClr val="tx1">
+                    <a:lumMod val="75000"/>
+                    <a:lumOff val="25000"/>
+                  </a:schemeClr>
+                </a:solidFill>
+              </a:rPr>
+              <a:t> </a:t>
+            </a:r>
+            <a:r>
+              <a:rPr lang="fr-FR" sz="2200" i="0" dirty="0" err="1">
+                <a:solidFill>
+                  <a:schemeClr val="tx1">
+                    <a:lumMod val="75000"/>
+                    <a:lumOff val="25000"/>
+                  </a:schemeClr>
+                </a:solidFill>
+              </a:rPr>
+              <a:t>used</a:t>
+            </a:r>
+            <a:r>
+              <a:rPr lang="fr-FR" sz="2200" i="0" dirty="0">
+                <a:solidFill>
+                  <a:schemeClr val="tx1">
+                    <a:lumMod val="75000"/>
+                    <a:lumOff val="25000"/>
+                  </a:schemeClr>
+                </a:solidFill>
+              </a:rPr>
+              <a:t> as the </a:t>
+            </a:r>
+            <a:r>
+              <a:rPr lang="fr-FR" sz="2200" i="0" dirty="0" err="1">
+                <a:solidFill>
+                  <a:schemeClr val="tx1">
+                    <a:lumMod val="75000"/>
+                    <a:lumOff val="25000"/>
+                  </a:schemeClr>
+                </a:solidFill>
+              </a:rPr>
+              <a:t>identified</a:t>
+            </a:r>
+            <a:r>
+              <a:rPr lang="fr-FR" sz="2200" i="0" dirty="0">
+                <a:solidFill>
+                  <a:schemeClr val="tx1">
+                    <a:lumMod val="75000"/>
+                    <a:lumOff val="25000"/>
+                  </a:schemeClr>
+                </a:solidFill>
+              </a:rPr>
+              <a:t> Profile (</a:t>
+            </a:r>
+            <a:r>
+              <a:rPr lang="fr-FR" sz="2200" i="0" dirty="0" err="1">
+                <a:solidFill>
+                  <a:schemeClr val="tx1">
+                    <a:lumMod val="75000"/>
+                    <a:lumOff val="25000"/>
+                  </a:schemeClr>
+                </a:solidFill>
+              </a:rPr>
+              <a:t>identity</a:t>
+            </a:r>
+            <a:r>
+              <a:rPr lang="fr-FR" sz="2200" i="0" dirty="0">
+                <a:solidFill>
+                  <a:schemeClr val="tx1">
+                    <a:lumMod val="75000"/>
+                    <a:lumOff val="25000"/>
+                  </a:schemeClr>
+                </a:solidFill>
+              </a:rPr>
+              <a:t> and </a:t>
+            </a:r>
+            <a:r>
+              <a:rPr lang="fr-FR" sz="2200" i="0" dirty="0" err="1">
+                <a:solidFill>
+                  <a:schemeClr val="tx1">
+                    <a:lumMod val="75000"/>
+                    <a:lumOff val="25000"/>
+                  </a:schemeClr>
+                </a:solidFill>
+              </a:rPr>
+              <a:t>preferences</a:t>
+            </a:r>
+            <a:r>
+              <a:rPr lang="fr-FR" sz="2200" i="0" dirty="0" smtClean="0">
+                <a:solidFill>
+                  <a:schemeClr val="tx1">
+                    <a:lumMod val="75000"/>
+                    <a:lumOff val="25000"/>
+                  </a:schemeClr>
+                </a:solidFill>
+              </a:rPr>
+              <a:t>)</a:t>
+            </a:r>
+          </a:p>
+          <a:p>
+            <a:pPr>
+              <a:buClr>
+                <a:srgbClr val="FF9900"/>
+              </a:buClr>
+              <a:buSzPct val="120000"/>
+              <a:buFont typeface="Lucida Grande"/>
+              <a:buChar char="»"/>
+            </a:pPr>
+            <a:endParaRPr lang="fr-FR" sz="2200" dirty="0" smtClean="0">
+              <a:solidFill>
+                <a:schemeClr val="tx1">
+                  <a:lumMod val="75000"/>
+                  <a:lumOff val="25000"/>
+                </a:schemeClr>
+              </a:solidFill>
+            </a:endParaRPr>
+          </a:p>
+          <a:p>
+            <a:pPr>
+              <a:buClr>
+                <a:srgbClr val="FF9900"/>
+              </a:buClr>
+              <a:buSzPct val="120000"/>
+              <a:buFont typeface="Lucida Grande"/>
+              <a:buChar char="»"/>
+            </a:pPr>
+            <a:r>
+              <a:rPr lang="fr-FR" sz="2200" i="0" dirty="0" smtClean="0">
+                <a:solidFill>
+                  <a:schemeClr val="tx1">
+                    <a:lumMod val="75000"/>
+                    <a:lumOff val="25000"/>
+                  </a:schemeClr>
+                </a:solidFill>
+              </a:rPr>
+              <a:t>Group </a:t>
+            </a:r>
+            <a:endParaRPr lang="fr-FR" sz="2200" i="0" dirty="0">
+              <a:solidFill>
+                <a:schemeClr val="tx1">
+                  <a:lumMod val="75000"/>
+                  <a:lumOff val="25000"/>
+                </a:schemeClr>
+              </a:solidFill>
+            </a:endParaRPr>
+          </a:p>
+          <a:p>
+            <a:pPr marL="3175" indent="0">
+              <a:buClr>
+                <a:srgbClr val="FF9900"/>
+              </a:buClr>
+              <a:buNone/>
+            </a:pPr>
+            <a:r>
+              <a:rPr lang="fr-FR" sz="2200" i="0" dirty="0">
+                <a:solidFill>
+                  <a:schemeClr val="tx1">
+                    <a:lumMod val="75000"/>
+                    <a:lumOff val="25000"/>
+                  </a:schemeClr>
+                </a:solidFill>
+              </a:rPr>
+              <a:t>	</a:t>
+            </a:r>
+            <a:r>
+              <a:rPr lang="fr-FR" sz="2200" i="0" dirty="0" smtClean="0">
+                <a:solidFill>
+                  <a:schemeClr val="tx1">
+                    <a:lumMod val="75000"/>
+                    <a:lumOff val="25000"/>
+                  </a:schemeClr>
+                </a:solidFill>
+              </a:rPr>
+              <a:t>- </a:t>
+            </a:r>
+            <a:r>
+              <a:rPr lang="fr-FR" sz="2200" i="0" dirty="0" err="1" smtClean="0">
+                <a:solidFill>
+                  <a:schemeClr val="tx1">
+                    <a:lumMod val="75000"/>
+                    <a:lumOff val="25000"/>
+                  </a:schemeClr>
+                </a:solidFill>
+              </a:rPr>
+              <a:t>Gather</a:t>
+            </a:r>
+            <a:r>
+              <a:rPr lang="fr-FR" sz="2200" i="0" dirty="0" smtClean="0">
+                <a:solidFill>
+                  <a:schemeClr val="tx1">
+                    <a:lumMod val="75000"/>
+                    <a:lumOff val="25000"/>
+                  </a:schemeClr>
+                </a:solidFill>
+              </a:rPr>
+              <a:t> </a:t>
+            </a:r>
+            <a:r>
+              <a:rPr lang="fr-FR" sz="2200" i="0" dirty="0">
+                <a:solidFill>
+                  <a:schemeClr val="tx1">
+                    <a:lumMod val="75000"/>
+                    <a:lumOff val="25000"/>
+                  </a:schemeClr>
+                </a:solidFill>
+              </a:rPr>
+              <a:t>a set of </a:t>
+            </a:r>
+            <a:r>
+              <a:rPr lang="fr-FR" sz="2200" i="0" dirty="0" err="1">
+                <a:solidFill>
+                  <a:schemeClr val="tx1">
+                    <a:lumMod val="75000"/>
+                    <a:lumOff val="25000"/>
+                  </a:schemeClr>
+                </a:solidFill>
+              </a:rPr>
+              <a:t>users</a:t>
+            </a:r>
+            <a:r>
+              <a:rPr lang="fr-FR" sz="2200" i="0" dirty="0">
+                <a:solidFill>
+                  <a:schemeClr val="tx1">
+                    <a:lumMod val="75000"/>
+                    <a:lumOff val="25000"/>
+                  </a:schemeClr>
+                </a:solidFill>
+              </a:rPr>
+              <a:t> Applicative or business </a:t>
+            </a:r>
+          </a:p>
+          <a:p>
+            <a:pPr marL="3175" indent="0">
+              <a:buNone/>
+            </a:pPr>
+            <a:r>
+              <a:rPr lang="fr-FR" sz="2200" i="0" dirty="0">
+                <a:solidFill>
+                  <a:schemeClr val="tx1">
+                    <a:lumMod val="75000"/>
+                    <a:lumOff val="25000"/>
+                  </a:schemeClr>
+                </a:solidFill>
+              </a:rPr>
+              <a:t>	</a:t>
+            </a:r>
+            <a:r>
+              <a:rPr lang="fr-FR" sz="2200" i="0" dirty="0" smtClean="0">
+                <a:solidFill>
+                  <a:schemeClr val="tx1">
+                    <a:lumMod val="75000"/>
+                    <a:lumOff val="25000"/>
+                  </a:schemeClr>
+                </a:solidFill>
+              </a:rPr>
+              <a:t>- </a:t>
+            </a:r>
+            <a:r>
+              <a:rPr lang="fr-FR" sz="2200" i="0" dirty="0" err="1">
+                <a:solidFill>
+                  <a:schemeClr val="tx1">
+                    <a:lumMod val="75000"/>
+                    <a:lumOff val="25000"/>
+                  </a:schemeClr>
+                </a:solidFill>
+              </a:rPr>
+              <a:t>Tree</a:t>
+            </a:r>
+            <a:r>
+              <a:rPr lang="fr-FR" sz="2200" i="0" dirty="0">
+                <a:solidFill>
+                  <a:schemeClr val="tx1">
+                    <a:lumMod val="75000"/>
+                    <a:lumOff val="25000"/>
+                  </a:schemeClr>
+                </a:solidFill>
+              </a:rPr>
+              <a:t> </a:t>
+            </a:r>
+            <a:r>
+              <a:rPr lang="fr-FR" sz="2200" i="0" dirty="0" err="1">
+                <a:solidFill>
+                  <a:schemeClr val="tx1">
+                    <a:lumMod val="75000"/>
+                    <a:lumOff val="25000"/>
+                  </a:schemeClr>
+                </a:solidFill>
+              </a:rPr>
+              <a:t>structureNo</a:t>
+            </a:r>
+            <a:r>
+              <a:rPr lang="fr-FR" sz="2200" i="0" dirty="0">
+                <a:solidFill>
+                  <a:schemeClr val="tx1">
+                    <a:lumMod val="75000"/>
+                    <a:lumOff val="25000"/>
+                  </a:schemeClr>
+                </a:solidFill>
+              </a:rPr>
+              <a:t> </a:t>
+            </a:r>
+            <a:r>
+              <a:rPr lang="fr-FR" sz="2200" i="0" dirty="0" err="1" smtClean="0">
+                <a:solidFill>
+                  <a:schemeClr val="tx1">
+                    <a:lumMod val="75000"/>
+                    <a:lumOff val="25000"/>
+                  </a:schemeClr>
+                </a:solidFill>
+              </a:rPr>
+              <a:t>inheritance</a:t>
+            </a:r>
+            <a:endParaRPr lang="fr-FR" sz="2200" i="0" dirty="0" smtClean="0">
+              <a:solidFill>
+                <a:schemeClr val="tx1">
+                  <a:lumMod val="75000"/>
+                  <a:lumOff val="25000"/>
+                </a:schemeClr>
+              </a:solidFill>
+            </a:endParaRPr>
+          </a:p>
+          <a:p>
+            <a:pPr marL="3175" indent="0">
+              <a:buNone/>
+            </a:pPr>
+            <a:r>
+              <a:rPr lang="fr-FR" sz="2200" dirty="0">
+                <a:solidFill>
+                  <a:schemeClr val="tx1">
+                    <a:lumMod val="75000"/>
+                    <a:lumOff val="25000"/>
+                  </a:schemeClr>
+                </a:solidFill>
+              </a:rPr>
+              <a:t>	</a:t>
+            </a:r>
+            <a:r>
+              <a:rPr lang="fr-FR" sz="2200" dirty="0" err="1" smtClean="0">
+                <a:solidFill>
+                  <a:schemeClr val="tx1">
+                    <a:lumMod val="75000"/>
+                    <a:lumOff val="25000"/>
+                  </a:schemeClr>
+                </a:solidFill>
+              </a:rPr>
+              <a:t>Expressed</a:t>
+            </a:r>
+            <a:r>
+              <a:rPr lang="fr-FR" sz="2200" dirty="0" smtClean="0">
+                <a:solidFill>
+                  <a:schemeClr val="tx1">
+                    <a:lumMod val="75000"/>
+                    <a:lumOff val="25000"/>
+                  </a:schemeClr>
+                </a:solidFill>
+              </a:rPr>
+              <a:t> </a:t>
+            </a:r>
+            <a:r>
+              <a:rPr lang="fr-FR" sz="2200" dirty="0">
+                <a:solidFill>
+                  <a:schemeClr val="tx1">
+                    <a:lumMod val="75000"/>
+                    <a:lumOff val="25000"/>
+                  </a:schemeClr>
+                </a:solidFill>
+              </a:rPr>
+              <a:t>as /group/</a:t>
+            </a:r>
+            <a:r>
+              <a:rPr lang="fr-FR" sz="2200" dirty="0" err="1">
+                <a:solidFill>
+                  <a:schemeClr val="tx1">
+                    <a:lumMod val="75000"/>
+                    <a:lumOff val="25000"/>
+                  </a:schemeClr>
+                </a:solidFill>
+              </a:rPr>
+              <a:t>subgroup</a:t>
+            </a:r>
+            <a:r>
+              <a:rPr lang="fr-FR" sz="2200" dirty="0">
+                <a:solidFill>
+                  <a:schemeClr val="tx1">
+                    <a:lumMod val="75000"/>
+                    <a:lumOff val="25000"/>
+                  </a:schemeClr>
+                </a:solidFill>
+              </a:rPr>
+              <a:t>/</a:t>
+            </a:r>
+            <a:r>
+              <a:rPr lang="fr-FR" sz="2200" dirty="0" err="1">
+                <a:solidFill>
+                  <a:schemeClr val="tx1">
+                    <a:lumMod val="75000"/>
+                    <a:lumOff val="25000"/>
+                  </a:schemeClr>
+                </a:solidFill>
+              </a:rPr>
+              <a:t>subsubgroup</a:t>
+            </a:r>
+            <a:endParaRPr lang="fr-FR" sz="2200" dirty="0">
+              <a:solidFill>
+                <a:schemeClr val="tx1">
+                  <a:lumMod val="75000"/>
+                  <a:lumOff val="25000"/>
+                </a:schemeClr>
+              </a:solidFill>
+            </a:endParaRPr>
+          </a:p>
+          <a:p>
+            <a:endParaRPr lang="fr-FR" sz="2200" dirty="0">
+              <a:solidFill>
+                <a:schemeClr val="tx1">
+                  <a:lumMod val="75000"/>
+                  <a:lumOff val="25000"/>
+                </a:schemeClr>
+              </a:solidFill>
+            </a:endParaRPr>
+          </a:p>
+          <a:p>
+            <a:pPr>
+              <a:buClr>
+                <a:srgbClr val="FF9900"/>
+              </a:buClr>
+              <a:buSzPct val="120000"/>
+              <a:buFont typeface="Lucida Grande"/>
+              <a:buChar char="»"/>
+            </a:pPr>
+            <a:r>
+              <a:rPr lang="fr-FR" sz="2200" i="0" dirty="0" err="1">
+                <a:solidFill>
+                  <a:schemeClr val="tx1">
+                    <a:lumMod val="75000"/>
+                    <a:lumOff val="25000"/>
+                  </a:schemeClr>
+                </a:solidFill>
+              </a:rPr>
+              <a:t>Membership</a:t>
+            </a:r>
+            <a:endParaRPr lang="fr-FR" sz="2200" i="0" dirty="0">
+              <a:solidFill>
+                <a:schemeClr val="tx1">
+                  <a:lumMod val="75000"/>
+                  <a:lumOff val="25000"/>
+                </a:schemeClr>
+              </a:solidFill>
+            </a:endParaRPr>
+          </a:p>
+          <a:p>
+            <a:pPr marL="3175" indent="0">
+              <a:buNone/>
+            </a:pPr>
+            <a:r>
+              <a:rPr lang="fr-FR" sz="2200" i="0" dirty="0" smtClean="0">
+                <a:solidFill>
+                  <a:schemeClr val="tx1">
+                    <a:lumMod val="75000"/>
+                    <a:lumOff val="25000"/>
+                  </a:schemeClr>
+                </a:solidFill>
+              </a:rPr>
+              <a:t>	- </a:t>
+            </a:r>
+            <a:r>
+              <a:rPr lang="fr-FR" sz="2200" i="0" dirty="0">
+                <a:solidFill>
+                  <a:schemeClr val="tx1">
+                    <a:lumMod val="75000"/>
+                    <a:lumOff val="25000"/>
+                  </a:schemeClr>
+                </a:solidFill>
+              </a:rPr>
+              <a:t>Qualifies the group </a:t>
+            </a:r>
+            <a:r>
+              <a:rPr lang="fr-FR" sz="2200" i="0" dirty="0" err="1">
+                <a:solidFill>
+                  <a:schemeClr val="tx1">
+                    <a:lumMod val="75000"/>
+                    <a:lumOff val="25000"/>
+                  </a:schemeClr>
+                </a:solidFill>
+              </a:rPr>
+              <a:t>belonging</a:t>
+            </a:r>
+            <a:endParaRPr lang="fr-FR" sz="2200" i="0" dirty="0">
+              <a:solidFill>
+                <a:schemeClr val="tx1">
+                  <a:lumMod val="75000"/>
+                  <a:lumOff val="25000"/>
+                </a:schemeClr>
+              </a:solidFill>
+            </a:endParaRPr>
+          </a:p>
+          <a:p>
+            <a:pPr marL="3175" indent="0">
+              <a:buNone/>
+            </a:pPr>
+            <a:r>
+              <a:rPr lang="fr-FR" sz="2200" i="0" dirty="0">
+                <a:solidFill>
+                  <a:schemeClr val="tx1">
+                    <a:lumMod val="75000"/>
+                    <a:lumOff val="25000"/>
+                  </a:schemeClr>
+                </a:solidFill>
+              </a:rPr>
+              <a:t>	</a:t>
+            </a:r>
+            <a:r>
+              <a:rPr lang="fr-FR" sz="2200" i="0" dirty="0" smtClean="0">
+                <a:solidFill>
+                  <a:schemeClr val="tx1">
+                    <a:lumMod val="75000"/>
+                    <a:lumOff val="25000"/>
+                  </a:schemeClr>
+                </a:solidFill>
+              </a:rPr>
+              <a:t>- </a:t>
+            </a:r>
+            <a:r>
+              <a:rPr lang="fr-FR" sz="2200" i="0" dirty="0">
+                <a:solidFill>
+                  <a:schemeClr val="tx1">
+                    <a:lumMod val="75000"/>
+                    <a:lumOff val="25000"/>
+                  </a:schemeClr>
+                </a:solidFill>
+              </a:rPr>
+              <a:t>"</a:t>
+            </a:r>
+            <a:r>
+              <a:rPr lang="fr-FR" sz="2200" i="0" dirty="0" err="1">
+                <a:solidFill>
+                  <a:schemeClr val="tx1">
+                    <a:lumMod val="75000"/>
+                    <a:lumOff val="25000"/>
+                  </a:schemeClr>
+                </a:solidFill>
+              </a:rPr>
+              <a:t>Member</a:t>
+            </a:r>
+            <a:r>
+              <a:rPr lang="fr-FR" sz="2200" i="0" dirty="0">
+                <a:solidFill>
+                  <a:schemeClr val="tx1">
+                    <a:lumMod val="75000"/>
+                    <a:lumOff val="25000"/>
+                  </a:schemeClr>
+                </a:solidFill>
+              </a:rPr>
+              <a:t> of group as </a:t>
+            </a:r>
+            <a:r>
+              <a:rPr lang="fr-FR" sz="2200" i="0" dirty="0" smtClean="0">
+                <a:solidFill>
+                  <a:schemeClr val="tx1">
+                    <a:lumMod val="75000"/>
+                    <a:lumOff val="25000"/>
+                  </a:schemeClr>
+                </a:solidFill>
+              </a:rPr>
+              <a:t>XXX »</a:t>
+            </a:r>
+            <a:endParaRPr lang="fr-FR" sz="2400" i="0" dirty="0" smtClean="0"/>
+          </a:p>
+          <a:p>
+            <a:pPr marL="3175" indent="0">
+              <a:buNone/>
+            </a:pPr>
+            <a:r>
+              <a:rPr lang="fr-FR" sz="2400" dirty="0"/>
+              <a:t>	</a:t>
+            </a:r>
+            <a:r>
+              <a:rPr lang="fr-FR" sz="2200" dirty="0" err="1" smtClean="0">
+                <a:solidFill>
+                  <a:schemeClr val="tx1">
+                    <a:lumMod val="75000"/>
+                    <a:lumOff val="25000"/>
+                  </a:schemeClr>
+                </a:solidFill>
+              </a:rPr>
+              <a:t>Expressed</a:t>
+            </a:r>
+            <a:r>
+              <a:rPr lang="fr-FR" sz="2200" dirty="0" smtClean="0">
+                <a:solidFill>
+                  <a:schemeClr val="tx1">
+                    <a:lumMod val="75000"/>
+                    <a:lumOff val="25000"/>
+                  </a:schemeClr>
+                </a:solidFill>
+              </a:rPr>
+              <a:t> </a:t>
+            </a:r>
+            <a:r>
+              <a:rPr lang="fr-FR" sz="2200" dirty="0">
+                <a:solidFill>
+                  <a:schemeClr val="tx1">
+                    <a:lumMod val="75000"/>
+                    <a:lumOff val="25000"/>
+                  </a:schemeClr>
+                </a:solidFill>
+              </a:rPr>
+              <a:t>as : manager:/</a:t>
+            </a:r>
+            <a:r>
+              <a:rPr lang="fr-FR" sz="2200" dirty="0" err="1">
+                <a:solidFill>
+                  <a:schemeClr val="tx1">
+                    <a:lumMod val="75000"/>
+                    <a:lumOff val="25000"/>
+                  </a:schemeClr>
+                </a:solidFill>
+              </a:rPr>
+              <a:t>organization</a:t>
+            </a:r>
+            <a:r>
+              <a:rPr lang="fr-FR" sz="2200" dirty="0">
+                <a:solidFill>
+                  <a:schemeClr val="tx1">
+                    <a:lumMod val="75000"/>
+                    <a:lumOff val="25000"/>
+                  </a:schemeClr>
+                </a:solidFill>
+              </a:rPr>
+              <a:t>/</a:t>
+            </a:r>
+            <a:r>
+              <a:rPr lang="fr-FR" sz="2200" dirty="0" err="1">
+                <a:solidFill>
+                  <a:schemeClr val="tx1">
+                    <a:lumMod val="75000"/>
+                    <a:lumOff val="25000"/>
+                  </a:schemeClr>
+                </a:solidFill>
+              </a:rPr>
+              <a:t>hr</a:t>
+            </a:r>
+            <a:r>
+              <a:rPr lang="fr-FR" sz="2200" dirty="0">
+                <a:solidFill>
+                  <a:schemeClr val="tx1">
+                    <a:lumMod val="75000"/>
+                    <a:lumOff val="25000"/>
+                  </a:schemeClr>
+                </a:solidFill>
+              </a:rPr>
+              <a:t>, *:/</a:t>
+            </a:r>
+            <a:r>
+              <a:rPr lang="fr-FR" sz="2200" dirty="0" err="1">
+                <a:solidFill>
+                  <a:schemeClr val="tx1">
+                    <a:lumMod val="75000"/>
+                    <a:lumOff val="25000"/>
+                  </a:schemeClr>
+                </a:solidFill>
+              </a:rPr>
+              <a:t>partners</a:t>
+            </a:r>
+            <a:endParaRPr lang="fr-FR" sz="2200" dirty="0" smtClean="0">
+              <a:solidFill>
+                <a:schemeClr val="tx1">
+                  <a:lumMod val="75000"/>
+                  <a:lumOff val="25000"/>
+                </a:schemeClr>
+              </a:solidFill>
+            </a:endParaRPr>
+          </a:p>
+          <a:p>
+            <a:pPr marL="3175" indent="0">
+              <a:buNone/>
+            </a:pPr>
+            <a:endParaRPr lang="fr-FR" sz="2000" dirty="0"/>
+          </a:p>
+          <a:p>
+            <a:pPr marL="3175" indent="0">
+              <a:buNone/>
+            </a:pPr>
+            <a:endParaRPr lang="fr-FR" sz="2000" dirty="0"/>
+          </a:p>
+          <a:p>
+            <a:pPr marL="3175" indent="0">
+              <a:buNone/>
+            </a:pPr>
+            <a:endParaRPr lang="fr-FR" dirty="0"/>
+          </a:p>
+        </p:txBody>
+      </p:sp>
+    </p:spTree>
+    <p:extLst>
+      <p:ext uri="{BB962C8B-B14F-4D97-AF65-F5344CB8AC3E}">
+        <p14:creationId xmlns:p14="http://schemas.microsoft.com/office/powerpoint/2010/main" val="2439149100"/>
+      </p:ext>
+    </p:extLst>
+  </p:cSld>
+  <p:clrMapOvr>
+    <a:masterClrMapping/>
+  </p:clrMapOvr>
+  <p:transition xmlns:p14="http://schemas.microsoft.com/office/powerpoint/2010/main"/>
+  <p:timing>
+    <p:tnLst>
+      <p:par>
+        <p:cTn xmlns:p14="http://schemas.microsoft.com/office/powerpoint/2010/main" id="1" dur="indefinite" restart="never" nodeType="tmRoot"/>
+      </p:par>
+    </p:tnLst>
+  </p:timing>
+</p:sld>
+</file>
+
+<file path=ppt/slides/slide40.xml><?xml version="1.0" encoding="utf-8"?>
+<p:sld xmlns:a="http://schemas.openxmlformats.org/drawingml/2006/main" xmlns:r="http://schemas.openxmlformats.org/officeDocument/2006/relationships" xmlns:p="http://schemas.openxmlformats.org/presentationml/2006/main">
+  <p:cSld>
+    <p:spTree>
+      <p:nvGrpSpPr>
+        <p:cNvPr id="1" name=""/>
+        <p:cNvGrpSpPr/>
+        <p:nvPr/>
+      </p:nvGrpSpPr>
+      <p:grpSpPr>
+        <a:xfrm>
+          <a:off x="0" y="0"/>
+          <a:ext cx="0" cy="0"/>
+          <a:chOff x="0" y="0"/>
+          <a:chExt cx="0" cy="0"/>
+        </a:xfrm>
+      </p:grpSpPr>
+      <p:sp>
+        <p:nvSpPr>
+          <p:cNvPr id="15362" name="Rectangle 1"/>
+          <p:cNvSpPr>
+            <a:spLocks noGrp="1" noChangeArrowheads="1"/>
+          </p:cNvSpPr>
+          <p:nvPr>
+            <p:ph type="title"/>
+          </p:nvPr>
+        </p:nvSpPr>
+        <p:spPr>
+          <a:xfrm>
+            <a:off x="490435" y="255926"/>
+            <a:ext cx="10179255" cy="454024"/>
+          </a:xfrm>
+        </p:spPr>
+        <p:txBody>
+          <a:bodyPr rIns="41783" anchor="b"/>
+          <a:lstStyle/>
+          <a:p>
+            <a:r>
+              <a:rPr lang="fr-FR" dirty="0" err="1" smtClean="0"/>
+              <a:t>Exercise</a:t>
+            </a:r>
+            <a:r>
+              <a:rPr lang="fr-FR" dirty="0" smtClean="0"/>
+              <a:t> 70c : SSO CAS</a:t>
+            </a:r>
+            <a:endParaRPr lang="fr-FR" dirty="0"/>
+          </a:p>
+        </p:txBody>
+      </p:sp>
+      <p:sp>
+        <p:nvSpPr>
+          <p:cNvPr id="15363" name="Rectangle 2"/>
+          <p:cNvSpPr>
+            <a:spLocks noGrp="1" noChangeArrowheads="1"/>
+          </p:cNvSpPr>
+          <p:nvPr>
+            <p:ph type="body" idx="1"/>
+          </p:nvPr>
+        </p:nvSpPr>
+        <p:spPr>
+          <a:xfrm>
+            <a:off x="472905" y="971525"/>
+            <a:ext cx="10219725" cy="5688632"/>
+          </a:xfrm>
+        </p:spPr>
+        <p:txBody>
+          <a:bodyPr rIns="41783" anchor="t"/>
+          <a:lstStyle/>
+          <a:p>
+            <a:pPr>
+              <a:lnSpc>
+                <a:spcPct val="100000"/>
+              </a:lnSpc>
+              <a:buClr>
+                <a:srgbClr val="FF9900"/>
+              </a:buClr>
+              <a:buSzPct val="120000"/>
+              <a:buFont typeface="Lucida Grande"/>
+              <a:buChar char="»"/>
+            </a:pPr>
+            <a:r>
+              <a:rPr lang="fr-FR" sz="2200" i="0" dirty="0" smtClean="0"/>
+              <a:t>Copy </a:t>
+            </a:r>
+            <a:r>
+              <a:rPr lang="fr-FR" sz="2200" i="0" dirty="0"/>
+              <a:t>all </a:t>
+            </a:r>
+            <a:r>
+              <a:rPr lang="fr-FR" sz="2200" i="0" dirty="0" err="1"/>
+              <a:t>libraries</a:t>
+            </a:r>
+            <a:r>
+              <a:rPr lang="fr-FR" sz="2200" i="0" dirty="0"/>
+              <a:t> </a:t>
+            </a:r>
+            <a:r>
+              <a:rPr lang="fr-FR" sz="2200" i="0" dirty="0" err="1"/>
+              <a:t>from</a:t>
+            </a:r>
+            <a:r>
+              <a:rPr lang="fr-FR" sz="2200" i="0" dirty="0"/>
+              <a:t> GATEIN_SSO_HOME/cas/</a:t>
+            </a:r>
+            <a:r>
+              <a:rPr lang="fr-FR" sz="2200" i="0" dirty="0" err="1"/>
+              <a:t>gatein.ear</a:t>
+            </a:r>
+            <a:r>
+              <a:rPr lang="fr-FR" sz="2200" i="0" dirty="0"/>
+              <a:t>/lib </a:t>
+            </a:r>
+            <a:r>
+              <a:rPr lang="fr-FR" sz="2200" i="0" dirty="0" err="1"/>
+              <a:t>into</a:t>
+            </a:r>
+            <a:r>
+              <a:rPr lang="fr-FR" sz="2200" i="0" dirty="0"/>
+              <a:t> </a:t>
+            </a:r>
+            <a:r>
+              <a:rPr lang="fr-FR" sz="2200" i="0" dirty="0" err="1" smtClean="0"/>
+              <a:t>tomcat_home</a:t>
+            </a:r>
+            <a:r>
+              <a:rPr lang="fr-FR" sz="2200" i="0" dirty="0" smtClean="0"/>
+              <a:t>/</a:t>
+            </a:r>
+            <a:r>
+              <a:rPr lang="fr-FR" sz="2200" i="0" dirty="0"/>
+              <a:t>lib</a:t>
+            </a:r>
+            <a:r>
+              <a:rPr lang="fr-FR" sz="2200" i="0" dirty="0" smtClean="0"/>
+              <a:t>)</a:t>
+            </a:r>
+            <a:endParaRPr lang="fr-FR" sz="2200" i="0" dirty="0" smtClean="0"/>
+          </a:p>
+          <a:p>
+            <a:pPr>
+              <a:lnSpc>
+                <a:spcPct val="100000"/>
+              </a:lnSpc>
+              <a:buClr>
+                <a:srgbClr val="FF9900"/>
+              </a:buClr>
+              <a:buSzPct val="120000"/>
+              <a:buFont typeface="Lucida Grande"/>
+              <a:buChar char="»"/>
+            </a:pPr>
+            <a:r>
+              <a:rPr lang="fr-FR" sz="2200" i="0" dirty="0"/>
+              <a:t>E</a:t>
+            </a:r>
+            <a:r>
+              <a:rPr lang="fr-FR" sz="2200" i="0" dirty="0" smtClean="0"/>
+              <a:t>dit </a:t>
+            </a:r>
+            <a:r>
+              <a:rPr lang="fr-FR" sz="2200" i="0" dirty="0"/>
+              <a:t>GATEIN_HOME/</a:t>
+            </a:r>
+            <a:r>
+              <a:rPr lang="fr-FR" sz="2200" i="0" dirty="0" err="1"/>
+              <a:t>conf</a:t>
+            </a:r>
+            <a:r>
+              <a:rPr lang="fr-FR" sz="2200" i="0" dirty="0"/>
+              <a:t>/</a:t>
+            </a:r>
+            <a:r>
+              <a:rPr lang="fr-FR" sz="2200" i="0" dirty="0" err="1"/>
+              <a:t>jaas.conf</a:t>
+            </a:r>
+            <a:r>
+              <a:rPr lang="fr-FR" sz="2200" i="0" dirty="0"/>
+              <a:t> and </a:t>
+            </a:r>
+            <a:r>
+              <a:rPr lang="fr-FR" sz="2200" i="0" dirty="0" err="1"/>
+              <a:t>uncomment</a:t>
+            </a:r>
+            <a:r>
+              <a:rPr lang="fr-FR" sz="2200" i="0" dirty="0"/>
+              <a:t> </a:t>
+            </a:r>
+            <a:r>
+              <a:rPr lang="fr-FR" sz="2200" i="0" dirty="0" err="1"/>
+              <a:t>this</a:t>
+            </a:r>
+            <a:r>
+              <a:rPr lang="fr-FR" sz="2200" i="0" dirty="0"/>
+              <a:t> section: </a:t>
+            </a:r>
+          </a:p>
+          <a:p>
+            <a:pPr marL="3175" indent="0">
+              <a:buNone/>
+            </a:pPr>
+            <a:r>
+              <a:rPr lang="fr-FR" sz="2400" i="0" dirty="0" smtClean="0"/>
+              <a:t>	</a:t>
+            </a:r>
+            <a:r>
+              <a:rPr lang="fr-FR" sz="2400" b="0" i="0" dirty="0" err="1" smtClean="0"/>
+              <a:t>org.gatein.sso.agent.login.SSOLoginModule</a:t>
+            </a:r>
+            <a:r>
+              <a:rPr lang="fr-FR" sz="2400" b="0" i="0" dirty="0" smtClean="0"/>
+              <a:t> </a:t>
+            </a:r>
+            <a:r>
+              <a:rPr lang="fr-FR" sz="2400" b="0" i="0" dirty="0" err="1"/>
+              <a:t>required</a:t>
+            </a:r>
+            <a:r>
+              <a:rPr lang="fr-FR" sz="2400" b="0" i="0" dirty="0"/>
+              <a:t> </a:t>
+            </a:r>
+            <a:r>
+              <a:rPr lang="fr-FR" sz="2400" b="0" i="0" dirty="0" smtClean="0"/>
+              <a:t>	org.exoplatform.services.security.j2ee.TomcatLoginModule 	</a:t>
+            </a:r>
+            <a:r>
+              <a:rPr lang="fr-FR" sz="2400" b="0" i="0" dirty="0" err="1" smtClean="0"/>
+              <a:t>required</a:t>
+            </a:r>
+            <a:r>
+              <a:rPr lang="fr-FR" sz="2400" b="0" i="0" dirty="0" smtClean="0"/>
+              <a:t> 	</a:t>
+            </a:r>
+            <a:r>
+              <a:rPr lang="fr-FR" sz="2400" b="0" i="0" dirty="0" err="1" smtClean="0"/>
+              <a:t>portalContainerName</a:t>
+            </a:r>
+            <a:r>
+              <a:rPr lang="fr-FR" sz="2400" b="0" i="0" dirty="0"/>
+              <a:t>=portal </a:t>
+            </a:r>
+            <a:r>
+              <a:rPr lang="fr-FR" sz="2400" b="0" i="0" dirty="0" err="1"/>
+              <a:t>realmName</a:t>
+            </a:r>
+            <a:r>
+              <a:rPr lang="fr-FR" sz="2400" b="0" i="0" dirty="0"/>
+              <a:t>=</a:t>
+            </a:r>
+            <a:r>
+              <a:rPr lang="fr-FR" sz="2400" b="0" i="0" dirty="0" err="1"/>
+              <a:t>gatein-domain</a:t>
+            </a:r>
+            <a:r>
+              <a:rPr lang="fr-FR" sz="2400" b="0" i="0" dirty="0"/>
+              <a:t> </a:t>
+            </a:r>
+            <a:endParaRPr lang="fr-FR" sz="2400" b="0" i="0" dirty="0" smtClean="0"/>
+          </a:p>
+          <a:p>
+            <a:pPr>
+              <a:lnSpc>
+                <a:spcPct val="100000"/>
+              </a:lnSpc>
+              <a:buClr>
+                <a:srgbClr val="FF9900"/>
+              </a:buClr>
+              <a:buSzPct val="120000"/>
+              <a:buFont typeface="Lucida Grande"/>
+              <a:buChar char="»"/>
+            </a:pPr>
+            <a:r>
+              <a:rPr lang="fr-FR" sz="2200" i="0" dirty="0"/>
+              <a:t>Start the </a:t>
+            </a:r>
+            <a:r>
+              <a:rPr lang="fr-FR" sz="2200" i="0" dirty="0" err="1"/>
+              <a:t>tomcat</a:t>
+            </a:r>
+            <a:r>
+              <a:rPr lang="fr-FR" sz="2200" i="0" dirty="0"/>
+              <a:t> and test </a:t>
+            </a:r>
+            <a:r>
+              <a:rPr lang="fr-FR" sz="2200" i="0" dirty="0" err="1"/>
+              <a:t>that</a:t>
+            </a:r>
+            <a:r>
+              <a:rPr lang="fr-FR" sz="2200" i="0" dirty="0"/>
+              <a:t> the CAS server </a:t>
+            </a:r>
+            <a:r>
+              <a:rPr lang="fr-FR" sz="2200" i="0" dirty="0" err="1"/>
+              <a:t>is</a:t>
+            </a:r>
+            <a:r>
+              <a:rPr lang="fr-FR" sz="2200" i="0" dirty="0"/>
+              <a:t> up &amp; running</a:t>
+            </a:r>
+            <a:r>
+              <a:rPr lang="fr-FR" sz="2200" i="0" dirty="0" smtClean="0"/>
+              <a:t>:</a:t>
+            </a:r>
+            <a:endParaRPr lang="fr-FR" sz="3600" i="0" dirty="0"/>
+          </a:p>
+          <a:p>
+            <a:pPr marL="3175" indent="0">
+              <a:lnSpc>
+                <a:spcPct val="100000"/>
+              </a:lnSpc>
+              <a:buClr>
+                <a:srgbClr val="FF9900"/>
+              </a:buClr>
+              <a:buSzPct val="120000"/>
+              <a:buNone/>
+            </a:pPr>
+            <a:r>
+              <a:rPr lang="pl-PL" sz="2400" b="0" i="0" dirty="0"/>
+              <a:t>	</a:t>
+            </a:r>
+            <a:r>
+              <a:rPr lang="pl-PL" sz="2400" b="0" i="0" dirty="0" smtClean="0">
+                <a:hlinkClick r:id="rId2"/>
+              </a:rPr>
+              <a:t>https:</a:t>
+            </a:r>
+            <a:r>
+              <a:rPr lang="pl-PL" sz="2400" b="0" i="0" dirty="0">
+                <a:hlinkClick r:id="rId2"/>
+              </a:rPr>
+              <a:t>//127.0.0.1:8080/</a:t>
+            </a:r>
+            <a:r>
+              <a:rPr lang="pl-PL" sz="2400" b="0" i="0" dirty="0" smtClean="0">
+                <a:hlinkClick r:id="rId2"/>
+              </a:rPr>
+              <a:t>cas</a:t>
+            </a:r>
+            <a:endParaRPr lang="fr-FR" sz="2200" i="0" dirty="0" smtClean="0"/>
+          </a:p>
+          <a:p>
+            <a:pPr>
+              <a:lnSpc>
+                <a:spcPct val="100000"/>
+              </a:lnSpc>
+              <a:buClr>
+                <a:srgbClr val="FF9900"/>
+              </a:buClr>
+              <a:buSzPct val="120000"/>
+              <a:buFont typeface="Lucida Grande"/>
+              <a:buChar char="»"/>
+            </a:pPr>
+            <a:r>
+              <a:rPr lang="fr-FR" sz="2200" i="0" dirty="0"/>
+              <a:t>Login </a:t>
+            </a:r>
+            <a:r>
+              <a:rPr lang="fr-FR" sz="2200" i="0" dirty="0" err="1"/>
+              <a:t>with</a:t>
+            </a:r>
+            <a:r>
+              <a:rPr lang="fr-FR" sz="2200" i="0" dirty="0"/>
+              <a:t> the </a:t>
+            </a:r>
+            <a:r>
+              <a:rPr lang="fr-FR" sz="2200" i="0" dirty="0" err="1"/>
+              <a:t>username</a:t>
+            </a:r>
+            <a:r>
+              <a:rPr lang="fr-FR" sz="2200" i="0" dirty="0"/>
+              <a:t> </a:t>
+            </a:r>
+            <a:r>
+              <a:rPr lang="fr-FR" sz="2200" i="0" dirty="0" err="1"/>
+              <a:t>root</a:t>
+            </a:r>
+            <a:r>
+              <a:rPr lang="fr-FR" sz="2200" i="0" dirty="0"/>
+              <a:t> and the </a:t>
+            </a:r>
+            <a:r>
+              <a:rPr lang="fr-FR" sz="2200" i="0" dirty="0" err="1"/>
+              <a:t>password</a:t>
+            </a:r>
+            <a:r>
+              <a:rPr lang="fr-FR" sz="2200" i="0" dirty="0"/>
+              <a:t> </a:t>
+            </a:r>
+            <a:r>
+              <a:rPr lang="fr-FR" sz="2200" i="0" dirty="0" err="1"/>
+              <a:t>gtn</a:t>
+            </a:r>
+            <a:r>
+              <a:rPr lang="fr-FR" sz="2200" i="0" dirty="0"/>
+              <a:t> (or </a:t>
+            </a:r>
+            <a:r>
+              <a:rPr lang="fr-FR" sz="2200" i="0" dirty="0" err="1"/>
+              <a:t>any</a:t>
+            </a:r>
+            <a:r>
+              <a:rPr lang="fr-FR" sz="2200" i="0" dirty="0"/>
+              <a:t> </a:t>
+            </a:r>
+            <a:r>
+              <a:rPr lang="fr-FR" sz="2200" i="0" dirty="0" err="1"/>
+              <a:t>account</a:t>
+            </a:r>
+            <a:r>
+              <a:rPr lang="fr-FR" sz="2200" i="0" dirty="0"/>
+              <a:t> </a:t>
+            </a:r>
+            <a:r>
+              <a:rPr lang="fr-FR" sz="2200" i="0" dirty="0" err="1"/>
+              <a:t>created</a:t>
+            </a:r>
+            <a:r>
+              <a:rPr lang="fr-FR" sz="2200" i="0" dirty="0"/>
+              <a:t> </a:t>
+            </a:r>
+            <a:r>
+              <a:rPr lang="fr-FR" sz="2200" i="0" dirty="0" err="1"/>
+              <a:t>through</a:t>
+            </a:r>
+            <a:r>
+              <a:rPr lang="fr-FR" sz="2200" i="0" dirty="0"/>
+              <a:t> the portal</a:t>
+            </a:r>
+            <a:r>
+              <a:rPr lang="fr-FR" sz="2200" i="0" dirty="0" smtClean="0"/>
+              <a:t>)</a:t>
+            </a:r>
+          </a:p>
+          <a:p>
+            <a:pPr>
+              <a:lnSpc>
+                <a:spcPct val="100000"/>
+              </a:lnSpc>
+              <a:buClr>
+                <a:srgbClr val="FF9900"/>
+              </a:buClr>
+              <a:buSzPct val="120000"/>
+              <a:buFont typeface="Lucida Grande"/>
+              <a:buChar char="»"/>
+            </a:pPr>
+            <a:r>
+              <a:rPr lang="fr-FR" sz="2200" i="0" dirty="0" smtClean="0"/>
+              <a:t>To </a:t>
+            </a:r>
+            <a:r>
+              <a:rPr lang="fr-FR" sz="2200" i="0" dirty="0" err="1"/>
+              <a:t>utilize</a:t>
+            </a:r>
+            <a:r>
+              <a:rPr lang="fr-FR" sz="2200" i="0" dirty="0"/>
+              <a:t> the Central </a:t>
+            </a:r>
+            <a:r>
+              <a:rPr lang="fr-FR" sz="2200" i="0" dirty="0" err="1"/>
+              <a:t>Authentication</a:t>
+            </a:r>
+            <a:r>
+              <a:rPr lang="fr-FR" sz="2200" i="0" dirty="0"/>
+              <a:t> Service, </a:t>
+            </a:r>
+            <a:r>
+              <a:rPr lang="fr-FR" sz="2200" i="0" dirty="0" err="1" smtClean="0"/>
+              <a:t>eXo</a:t>
+            </a:r>
+            <a:r>
+              <a:rPr lang="fr-FR" sz="2200" i="0" dirty="0" smtClean="0"/>
+              <a:t> </a:t>
+            </a:r>
+            <a:r>
+              <a:rPr lang="fr-FR" sz="2200" i="0" dirty="0" err="1" smtClean="0"/>
+              <a:t>needs</a:t>
+            </a:r>
+            <a:r>
+              <a:rPr lang="fr-FR" sz="2200" i="0" dirty="0" smtClean="0"/>
+              <a:t> </a:t>
+            </a:r>
+            <a:r>
+              <a:rPr lang="fr-FR" sz="2200" i="0" dirty="0"/>
+              <a:t>to </a:t>
+            </a:r>
+            <a:r>
+              <a:rPr lang="fr-FR" sz="2200" i="0" dirty="0" err="1"/>
+              <a:t>redirect</a:t>
+            </a:r>
+            <a:r>
+              <a:rPr lang="fr-FR" sz="2200" i="0" dirty="0"/>
+              <a:t> all user </a:t>
+            </a:r>
+            <a:r>
+              <a:rPr lang="fr-FR" sz="2200" i="0" dirty="0" err="1"/>
+              <a:t>authentication</a:t>
+            </a:r>
+            <a:r>
+              <a:rPr lang="fr-FR" sz="2200" i="0" dirty="0"/>
+              <a:t> to the CAS server. </a:t>
+            </a:r>
+          </a:p>
+          <a:p>
+            <a:pPr marL="3175" indent="0">
+              <a:lnSpc>
+                <a:spcPct val="100000"/>
+              </a:lnSpc>
+              <a:buClr>
+                <a:srgbClr val="FF9900"/>
+              </a:buClr>
+              <a:buSzPct val="120000"/>
+              <a:buNone/>
+            </a:pPr>
+            <a:endParaRPr lang="fr-FR" sz="2200" i="0" dirty="0" smtClean="0"/>
+          </a:p>
+          <a:p>
+            <a:pPr>
+              <a:lnSpc>
+                <a:spcPct val="100000"/>
+              </a:lnSpc>
+              <a:buClr>
+                <a:srgbClr val="FF9900"/>
+              </a:buClr>
+              <a:buSzPct val="120000"/>
+              <a:buFont typeface="Lucida Grande"/>
+              <a:buChar char="»"/>
+            </a:pPr>
+            <a:endParaRPr lang="fr-FR" sz="2200" b="0" i="0" dirty="0"/>
+          </a:p>
+          <a:p>
+            <a:pPr marL="3175" indent="0">
+              <a:buNone/>
+            </a:pPr>
+            <a:endParaRPr lang="fr-FR" sz="1800" b="0" i="0" dirty="0">
+              <a:solidFill>
+                <a:schemeClr val="tx1">
+                  <a:lumMod val="75000"/>
+                  <a:lumOff val="25000"/>
+                </a:schemeClr>
+              </a:solidFill>
+            </a:endParaRPr>
+          </a:p>
+          <a:p>
+            <a:pPr>
+              <a:lnSpc>
+                <a:spcPct val="100000"/>
+              </a:lnSpc>
+              <a:buClr>
+                <a:srgbClr val="FF9900"/>
+              </a:buClr>
+              <a:buSzPct val="120000"/>
+              <a:buFont typeface="Lucida Grande"/>
+              <a:buChar char="»"/>
+            </a:pPr>
+            <a:endParaRPr lang="fr-FR" sz="1800" b="0" i="0" dirty="0">
+              <a:solidFill>
+                <a:schemeClr val="tx1">
+                  <a:lumMod val="75000"/>
+                  <a:lumOff val="25000"/>
+                </a:schemeClr>
+              </a:solidFill>
+            </a:endParaRPr>
+          </a:p>
+          <a:p>
+            <a:pPr>
+              <a:lnSpc>
+                <a:spcPct val="100000"/>
+              </a:lnSpc>
+              <a:buClr>
+                <a:srgbClr val="FF9900"/>
+              </a:buClr>
+              <a:buSzPct val="120000"/>
+              <a:buFont typeface="Lucida Grande"/>
+              <a:buChar char="»"/>
+            </a:pPr>
+            <a:endParaRPr lang="fr-FR" sz="1800" i="0" dirty="0">
+              <a:solidFill>
+                <a:schemeClr val="tx1">
+                  <a:lumMod val="75000"/>
+                  <a:lumOff val="25000"/>
+                </a:schemeClr>
+              </a:solidFill>
+            </a:endParaRPr>
+          </a:p>
+          <a:p>
+            <a:pPr>
+              <a:lnSpc>
+                <a:spcPct val="100000"/>
+              </a:lnSpc>
+              <a:buClr>
+                <a:srgbClr val="FF9900"/>
+              </a:buClr>
+              <a:buSzPct val="120000"/>
+              <a:buFont typeface="Lucida Grande"/>
+              <a:buChar char="»"/>
+            </a:pPr>
+            <a:endParaRPr lang="fr-FR" sz="1800" i="0" dirty="0">
+              <a:solidFill>
+                <a:schemeClr val="tx1">
+                  <a:lumMod val="75000"/>
+                  <a:lumOff val="25000"/>
+                </a:schemeClr>
+              </a:solidFill>
+            </a:endParaRPr>
+          </a:p>
+        </p:txBody>
+      </p:sp>
+    </p:spTree>
+    <p:extLst>
+      <p:ext uri="{BB962C8B-B14F-4D97-AF65-F5344CB8AC3E}">
+        <p14:creationId xmlns:p14="http://schemas.microsoft.com/office/powerpoint/2010/main" val="1020765242"/>
+      </p:ext>
+    </p:extLst>
+  </p:cSld>
+  <p:clrMapOvr>
+    <a:masterClrMapping/>
+  </p:clrMapOvr>
+  <p:transition xmlns:p14="http://schemas.microsoft.com/office/powerpoint/2010/main"/>
+  <p:timing>
+    <p:tnLst>
+      <p:par>
+        <p:cTn xmlns:p14="http://schemas.microsoft.com/office/powerpoint/2010/main" id="1" dur="indefinite" restart="never" nodeType="tmRoot"/>
+      </p:par>
+    </p:tnLst>
+  </p:timing>
+</p:sld>
+</file>
+
+<file path=ppt/slides/slide41.xml><?xml version="1.0" encoding="utf-8"?>
+<p:sld xmlns:a="http://schemas.openxmlformats.org/drawingml/2006/main" xmlns:r="http://schemas.openxmlformats.org/officeDocument/2006/relationships" xmlns:p="http://schemas.openxmlformats.org/presentationml/2006/main">
+  <p:cSld>
+    <p:spTree>
+      <p:nvGrpSpPr>
+        <p:cNvPr id="1" name=""/>
+        <p:cNvGrpSpPr/>
+        <p:nvPr/>
+      </p:nvGrpSpPr>
+      <p:grpSpPr>
+        <a:xfrm>
+          <a:off x="0" y="0"/>
+          <a:ext cx="0" cy="0"/>
+          <a:chOff x="0" y="0"/>
+          <a:chExt cx="0" cy="0"/>
+        </a:xfrm>
+      </p:grpSpPr>
+      <p:sp>
+        <p:nvSpPr>
+          <p:cNvPr id="15362" name="Rectangle 1"/>
+          <p:cNvSpPr>
+            <a:spLocks noGrp="1" noChangeArrowheads="1"/>
+          </p:cNvSpPr>
+          <p:nvPr>
+            <p:ph type="title"/>
+          </p:nvPr>
+        </p:nvSpPr>
+        <p:spPr>
+          <a:xfrm>
+            <a:off x="490435" y="255926"/>
+            <a:ext cx="10179255" cy="454024"/>
+          </a:xfrm>
+        </p:spPr>
+        <p:txBody>
+          <a:bodyPr rIns="41783" anchor="b"/>
+          <a:lstStyle/>
+          <a:p>
+            <a:r>
+              <a:rPr lang="fr-FR" dirty="0" err="1" smtClean="0"/>
+              <a:t>Exercise</a:t>
+            </a:r>
+            <a:r>
+              <a:rPr lang="fr-FR" dirty="0" smtClean="0"/>
+              <a:t> 70c : SSO CAS</a:t>
+            </a:r>
+            <a:endParaRPr lang="fr-FR" dirty="0"/>
+          </a:p>
+        </p:txBody>
+      </p:sp>
+      <p:sp>
+        <p:nvSpPr>
+          <p:cNvPr id="15363" name="Rectangle 2"/>
+          <p:cNvSpPr>
+            <a:spLocks noGrp="1" noChangeArrowheads="1"/>
+          </p:cNvSpPr>
+          <p:nvPr>
+            <p:ph type="body" idx="1"/>
+          </p:nvPr>
+        </p:nvSpPr>
+        <p:spPr>
+          <a:xfrm>
+            <a:off x="472905" y="971525"/>
+            <a:ext cx="10219725" cy="5688632"/>
+          </a:xfrm>
+        </p:spPr>
+        <p:txBody>
+          <a:bodyPr rIns="41783" anchor="t"/>
+          <a:lstStyle/>
+          <a:p>
+            <a:pPr>
+              <a:lnSpc>
+                <a:spcPct val="100000"/>
+              </a:lnSpc>
+              <a:buClr>
+                <a:srgbClr val="FF9900"/>
+              </a:buClr>
+              <a:buSzPct val="120000"/>
+              <a:buFont typeface="Lucida Grande"/>
+              <a:buChar char="»"/>
+            </a:pPr>
+            <a:r>
+              <a:rPr lang="fr-FR" sz="2200" i="0" dirty="0" smtClean="0"/>
+              <a:t>Information </a:t>
+            </a:r>
+            <a:r>
+              <a:rPr lang="fr-FR" sz="2200" i="0" dirty="0"/>
+              <a:t>about </a:t>
+            </a:r>
+            <a:r>
+              <a:rPr lang="fr-FR" sz="2200" i="0" dirty="0" err="1"/>
+              <a:t>where</a:t>
+            </a:r>
+            <a:r>
+              <a:rPr lang="fr-FR" sz="2200" i="0" dirty="0"/>
+              <a:t> the CAS </a:t>
+            </a:r>
+            <a:r>
+              <a:rPr lang="fr-FR" sz="2200" i="0" dirty="0" err="1"/>
+              <a:t>is</a:t>
+            </a:r>
+            <a:r>
+              <a:rPr lang="fr-FR" sz="2200" i="0" dirty="0"/>
+              <a:t> </a:t>
+            </a:r>
+            <a:r>
+              <a:rPr lang="fr-FR" sz="2200" i="0" dirty="0" err="1"/>
+              <a:t>hosted</a:t>
+            </a:r>
+            <a:r>
+              <a:rPr lang="fr-FR" sz="2200" i="0" dirty="0"/>
+              <a:t> must </a:t>
+            </a:r>
+            <a:r>
+              <a:rPr lang="fr-FR" sz="2200" i="0" dirty="0" err="1"/>
+              <a:t>be</a:t>
+            </a:r>
+            <a:r>
+              <a:rPr lang="fr-FR" sz="2200" i="0" dirty="0"/>
+              <a:t> </a:t>
+            </a:r>
+            <a:r>
+              <a:rPr lang="fr-FR" sz="2200" i="0" dirty="0" err="1"/>
+              <a:t>properly</a:t>
+            </a:r>
+            <a:r>
+              <a:rPr lang="fr-FR" sz="2200" i="0" dirty="0"/>
+              <a:t> </a:t>
+            </a:r>
+            <a:r>
+              <a:rPr lang="fr-FR" sz="2200" i="0" dirty="0" err="1"/>
+              <a:t>configured</a:t>
+            </a:r>
+            <a:r>
+              <a:rPr lang="fr-FR" sz="2200" i="0" dirty="0"/>
+              <a:t> </a:t>
+            </a:r>
+            <a:r>
+              <a:rPr lang="fr-FR" sz="2200" i="0" dirty="0" err="1"/>
+              <a:t>within</a:t>
+            </a:r>
+            <a:r>
+              <a:rPr lang="fr-FR" sz="2200" i="0" dirty="0"/>
+              <a:t> the </a:t>
+            </a:r>
+            <a:r>
+              <a:rPr lang="fr-FR" sz="2200" i="0" dirty="0" err="1" smtClean="0"/>
+              <a:t>eXo</a:t>
+            </a:r>
+            <a:r>
+              <a:rPr lang="fr-FR" sz="2200" i="0" dirty="0" smtClean="0"/>
+              <a:t> instance</a:t>
+            </a:r>
+            <a:r>
+              <a:rPr lang="fr-FR" sz="2200" i="0" dirty="0"/>
+              <a:t>. The </a:t>
+            </a:r>
+            <a:r>
+              <a:rPr lang="fr-FR" sz="2200" i="0" dirty="0" err="1"/>
+              <a:t>required</a:t>
+            </a:r>
+            <a:r>
+              <a:rPr lang="fr-FR" sz="2200" i="0" dirty="0"/>
+              <a:t> configuration </a:t>
+            </a:r>
+            <a:r>
+              <a:rPr lang="fr-FR" sz="2200" i="0" dirty="0" err="1"/>
+              <a:t>is</a:t>
+            </a:r>
+            <a:r>
+              <a:rPr lang="fr-FR" sz="2200" i="0" dirty="0"/>
+              <a:t> </a:t>
+            </a:r>
+            <a:r>
+              <a:rPr lang="fr-FR" sz="2200" i="0" dirty="0" err="1"/>
+              <a:t>done</a:t>
+            </a:r>
+            <a:r>
+              <a:rPr lang="fr-FR" sz="2200" i="0" dirty="0"/>
+              <a:t> by </a:t>
+            </a:r>
+            <a:r>
+              <a:rPr lang="fr-FR" sz="2200" i="0" dirty="0" err="1" smtClean="0"/>
+              <a:t>modifying</a:t>
+            </a:r>
+            <a:r>
+              <a:rPr lang="fr-FR" sz="2200" i="0" dirty="0" smtClean="0"/>
+              <a:t>:</a:t>
+            </a:r>
+          </a:p>
+          <a:p>
+            <a:pPr marL="3175" indent="0">
+              <a:lnSpc>
+                <a:spcPct val="100000"/>
+              </a:lnSpc>
+              <a:buClr>
+                <a:srgbClr val="FF9900"/>
+              </a:buClr>
+              <a:buSzPct val="120000"/>
+              <a:buNone/>
+            </a:pPr>
+            <a:r>
+              <a:rPr lang="fr-FR" sz="2200" i="0" dirty="0" smtClean="0"/>
+              <a:t>	-  </a:t>
+            </a:r>
+            <a:r>
+              <a:rPr lang="fr-FR" sz="2200" i="0" dirty="0" err="1" smtClean="0"/>
+              <a:t>tomcat_home</a:t>
+            </a:r>
+            <a:r>
+              <a:rPr lang="fr-FR" sz="2200" i="0" dirty="0" smtClean="0"/>
+              <a:t>/</a:t>
+            </a:r>
+            <a:r>
+              <a:rPr lang="fr-FR" sz="2200" i="0" dirty="0" err="1" smtClean="0"/>
+              <a:t>webapps</a:t>
+            </a:r>
+            <a:r>
+              <a:rPr lang="fr-FR" sz="2200" i="0" dirty="0"/>
+              <a:t>/</a:t>
+            </a:r>
+            <a:r>
+              <a:rPr lang="fr-FR" sz="2200" i="0" dirty="0" err="1"/>
+              <a:t>platform</a:t>
+            </a:r>
+            <a:r>
+              <a:rPr lang="fr-FR" sz="2200" i="0" dirty="0"/>
+              <a:t>-extension/login/</a:t>
+            </a:r>
+            <a:r>
+              <a:rPr lang="fr-FR" sz="2200" i="0" dirty="0" err="1" smtClean="0"/>
+              <a:t>jsp</a:t>
+            </a:r>
+            <a:r>
+              <a:rPr lang="fr-FR" sz="2200" i="0" dirty="0" smtClean="0"/>
+              <a:t>/</a:t>
+            </a:r>
+            <a:r>
+              <a:rPr lang="fr-FR" sz="2200" i="0" dirty="0" err="1" smtClean="0"/>
+              <a:t>login.jsp</a:t>
+            </a:r>
+            <a:endParaRPr lang="fr-FR" sz="2200" i="0" dirty="0" smtClean="0"/>
+          </a:p>
+          <a:p>
+            <a:pPr marL="3175" indent="0">
+              <a:lnSpc>
+                <a:spcPct val="100000"/>
+              </a:lnSpc>
+              <a:buNone/>
+            </a:pPr>
+            <a:r>
+              <a:rPr lang="fr-FR" sz="2200" i="0" dirty="0"/>
+              <a:t>	</a:t>
+            </a:r>
+            <a:r>
+              <a:rPr lang="fr-FR" sz="2200" i="0" dirty="0" smtClean="0"/>
+              <a:t>-  </a:t>
+            </a:r>
+            <a:r>
+              <a:rPr lang="fr-FR" sz="2200" i="0" dirty="0"/>
+              <a:t>Replace the </a:t>
+            </a:r>
+            <a:r>
+              <a:rPr lang="fr-FR" sz="2200" i="0" dirty="0" err="1"/>
+              <a:t>InitiateLoginServlet</a:t>
+            </a:r>
+            <a:r>
+              <a:rPr lang="fr-FR" sz="2200" i="0" dirty="0"/>
+              <a:t> </a:t>
+            </a:r>
+            <a:r>
+              <a:rPr lang="fr-FR" sz="2200" i="0" dirty="0" err="1"/>
+              <a:t>declaration</a:t>
+            </a:r>
+            <a:r>
+              <a:rPr lang="fr-FR" sz="2200" i="0" dirty="0"/>
+              <a:t> in </a:t>
+            </a:r>
+            <a:r>
+              <a:rPr lang="fr-FR" sz="2200" i="0" dirty="0" err="1"/>
+              <a:t>tomcat_home</a:t>
+            </a:r>
+            <a:r>
+              <a:rPr lang="fr-FR" sz="2200" i="0" dirty="0"/>
+              <a:t>/</a:t>
+            </a:r>
+            <a:r>
+              <a:rPr lang="fr-FR" sz="2200" i="0" dirty="0" err="1"/>
+              <a:t>webapps</a:t>
+            </a:r>
+            <a:r>
+              <a:rPr lang="fr-FR" sz="2200" i="0" dirty="0"/>
+              <a:t>/</a:t>
+            </a:r>
+            <a:r>
+              <a:rPr lang="fr-FR" sz="2200" i="0" dirty="0" smtClean="0"/>
+              <a:t>portal/</a:t>
+            </a:r>
+            <a:r>
+              <a:rPr lang="fr-FR" sz="2200" i="0" dirty="0"/>
+              <a:t>WEB-INF/</a:t>
+            </a:r>
+            <a:r>
+              <a:rPr lang="fr-FR" sz="2200" i="0" dirty="0" err="1"/>
+              <a:t>web.xml</a:t>
+            </a:r>
+            <a:r>
+              <a:rPr lang="fr-FR" sz="2200" i="0" dirty="0"/>
+              <a:t> </a:t>
+            </a:r>
+            <a:r>
+              <a:rPr lang="fr-FR" sz="2200" i="0" dirty="0" err="1"/>
+              <a:t>with</a:t>
+            </a:r>
+            <a:r>
+              <a:rPr lang="fr-FR" sz="2200" i="0" dirty="0"/>
+              <a:t>: </a:t>
+            </a:r>
+          </a:p>
+          <a:p>
+            <a:pPr marL="3175" indent="0">
+              <a:lnSpc>
+                <a:spcPct val="80000"/>
+              </a:lnSpc>
+              <a:buNone/>
+            </a:pPr>
+            <a:r>
+              <a:rPr lang="fr-FR" sz="2200" i="0" dirty="0" smtClean="0"/>
+              <a:t>	</a:t>
+            </a:r>
+            <a:r>
+              <a:rPr lang="fr-FR" sz="1800" b="0" i="0" dirty="0" smtClean="0"/>
+              <a:t>&lt;</a:t>
+            </a:r>
+            <a:r>
+              <a:rPr lang="fr-FR" sz="1800" b="0" i="0" dirty="0"/>
+              <a:t>servlet&gt; </a:t>
+            </a:r>
+            <a:r>
+              <a:rPr lang="fr-FR" sz="1800" b="0" i="0" dirty="0" smtClean="0"/>
+              <a:t>&lt;</a:t>
+            </a:r>
+            <a:r>
+              <a:rPr lang="fr-FR" sz="1800" b="0" i="0" dirty="0"/>
+              <a:t>servlet-</a:t>
+            </a:r>
+            <a:r>
+              <a:rPr lang="fr-FR" sz="1800" b="0" i="0" dirty="0" err="1"/>
+              <a:t>name</a:t>
+            </a:r>
+            <a:r>
+              <a:rPr lang="fr-FR" sz="1800" b="0" i="0" dirty="0"/>
+              <a:t>&gt;</a:t>
+            </a:r>
+            <a:r>
+              <a:rPr lang="fr-FR" sz="1800" b="0" i="0" dirty="0" err="1"/>
+              <a:t>InitiateLoginServlet</a:t>
+            </a:r>
+            <a:r>
+              <a:rPr lang="fr-FR" sz="1800" b="0" i="0" dirty="0"/>
+              <a:t>&lt;/servlet-</a:t>
+            </a:r>
+            <a:r>
+              <a:rPr lang="fr-FR" sz="1800" b="0" i="0" dirty="0" err="1"/>
+              <a:t>name</a:t>
+            </a:r>
+            <a:r>
+              <a:rPr lang="fr-FR" sz="1800" b="0" i="0" dirty="0"/>
+              <a:t>&gt; &lt;servlet-class&gt;</a:t>
+            </a:r>
+            <a:r>
+              <a:rPr lang="fr-FR" sz="1800" b="0" i="0" dirty="0" err="1"/>
+              <a:t>org.gatein.sso.agent.GenericSSOAgent</a:t>
+            </a:r>
+            <a:r>
+              <a:rPr lang="fr-FR" sz="1800" b="0" i="0" dirty="0"/>
+              <a:t>&lt;/servlet-class&gt; &lt;</a:t>
+            </a:r>
+            <a:r>
+              <a:rPr lang="fr-FR" sz="1800" b="0" i="0" dirty="0" err="1"/>
+              <a:t>init-param</a:t>
+            </a:r>
+            <a:r>
+              <a:rPr lang="fr-FR" sz="1800" b="0" i="0" dirty="0"/>
+              <a:t>&gt; &lt;</a:t>
+            </a:r>
+            <a:r>
+              <a:rPr lang="fr-FR" sz="1800" b="0" i="0" dirty="0" err="1"/>
+              <a:t>param-name</a:t>
+            </a:r>
+            <a:r>
+              <a:rPr lang="fr-FR" sz="1800" b="0" i="0" dirty="0"/>
+              <a:t>&gt;</a:t>
+            </a:r>
+            <a:r>
+              <a:rPr lang="fr-FR" sz="1800" b="0" i="0" dirty="0" err="1"/>
+              <a:t>ssoServerUrl</a:t>
+            </a:r>
+            <a:r>
+              <a:rPr lang="fr-FR" sz="1800" b="0" i="0" dirty="0"/>
+              <a:t>&lt;/</a:t>
+            </a:r>
+            <a:r>
+              <a:rPr lang="fr-FR" sz="1800" b="0" i="0" dirty="0" err="1"/>
+              <a:t>param-name</a:t>
+            </a:r>
+            <a:r>
+              <a:rPr lang="fr-FR" sz="1800" b="0" i="0" dirty="0"/>
+              <a:t>&gt; &lt;</a:t>
+            </a:r>
+            <a:r>
+              <a:rPr lang="fr-FR" sz="1800" b="0" i="0" dirty="0" err="1"/>
+              <a:t>param</a:t>
+            </a:r>
+            <a:r>
+              <a:rPr lang="fr-FR" sz="1800" b="0" i="0" dirty="0"/>
+              <a:t>-value&gt;http://localhost:8888/cas&lt;/</a:t>
+            </a:r>
+            <a:r>
+              <a:rPr lang="fr-FR" sz="1800" b="0" i="0" dirty="0" err="1"/>
+              <a:t>param</a:t>
+            </a:r>
+            <a:r>
+              <a:rPr lang="fr-FR" sz="1800" b="0" i="0" dirty="0"/>
+              <a:t>-value&gt; &lt;/</a:t>
+            </a:r>
+            <a:r>
+              <a:rPr lang="fr-FR" sz="1800" b="0" i="0" dirty="0" err="1"/>
+              <a:t>init-param</a:t>
+            </a:r>
+            <a:r>
+              <a:rPr lang="fr-FR" sz="1800" b="0" i="0" dirty="0"/>
+              <a:t>&gt; &lt;</a:t>
+            </a:r>
+            <a:r>
+              <a:rPr lang="fr-FR" sz="1800" b="0" i="0" dirty="0" err="1"/>
+              <a:t>init-param</a:t>
+            </a:r>
+            <a:r>
+              <a:rPr lang="fr-FR" sz="1800" b="0" i="0" dirty="0"/>
+              <a:t>&gt; &lt;</a:t>
+            </a:r>
+            <a:r>
+              <a:rPr lang="fr-FR" sz="1800" b="0" i="0" dirty="0" err="1"/>
+              <a:t>param-name</a:t>
+            </a:r>
+            <a:r>
+              <a:rPr lang="fr-FR" sz="1800" b="0" i="0" dirty="0"/>
+              <a:t>&gt;</a:t>
+            </a:r>
+            <a:r>
+              <a:rPr lang="fr-FR" sz="1800" b="0" i="0" dirty="0" err="1"/>
+              <a:t>casRenewTicket</a:t>
+            </a:r>
+            <a:r>
+              <a:rPr lang="fr-FR" sz="1800" b="0" i="0" dirty="0"/>
+              <a:t>&lt;/</a:t>
+            </a:r>
+            <a:r>
+              <a:rPr lang="fr-FR" sz="1800" b="0" i="0" dirty="0" err="1"/>
+              <a:t>param-name</a:t>
+            </a:r>
+            <a:r>
+              <a:rPr lang="fr-FR" sz="1800" b="0" i="0" dirty="0"/>
+              <a:t>&gt; &lt;</a:t>
+            </a:r>
+            <a:r>
+              <a:rPr lang="fr-FR" sz="1800" b="0" i="0" dirty="0" err="1"/>
+              <a:t>param</a:t>
+            </a:r>
+            <a:r>
+              <a:rPr lang="fr-FR" sz="1800" b="0" i="0" dirty="0"/>
+              <a:t>-value&gt;false&lt;/</a:t>
+            </a:r>
+            <a:r>
+              <a:rPr lang="fr-FR" sz="1800" b="0" i="0" dirty="0" err="1"/>
+              <a:t>param</a:t>
+            </a:r>
+            <a:r>
+              <a:rPr lang="fr-FR" sz="1800" b="0" i="0" dirty="0"/>
+              <a:t>-value&gt; &lt;/</a:t>
+            </a:r>
+            <a:r>
+              <a:rPr lang="fr-FR" sz="1800" b="0" i="0" dirty="0" err="1"/>
+              <a:t>init-param</a:t>
+            </a:r>
+            <a:r>
+              <a:rPr lang="fr-FR" sz="1800" b="0" i="0" dirty="0"/>
+              <a:t>&gt; &lt;/servlet&gt; </a:t>
+            </a:r>
+            <a:endParaRPr lang="fr-FR" sz="1800" b="0" i="0" dirty="0" smtClean="0"/>
+          </a:p>
+          <a:p>
+            <a:pPr marL="3175" indent="0">
+              <a:lnSpc>
+                <a:spcPct val="80000"/>
+              </a:lnSpc>
+              <a:buNone/>
+            </a:pPr>
+            <a:r>
+              <a:rPr lang="fr-FR" sz="1800" b="0" i="0" dirty="0" err="1" smtClean="0"/>
+              <a:t>Try</a:t>
+            </a:r>
+            <a:r>
+              <a:rPr lang="fr-FR" sz="1800" b="0" i="0" dirty="0" smtClean="0"/>
+              <a:t> to </a:t>
+            </a:r>
+            <a:r>
+              <a:rPr lang="fr-FR" sz="1800" b="0" i="0" dirty="0" err="1" smtClean="0"/>
+              <a:t>access</a:t>
+            </a:r>
+            <a:r>
+              <a:rPr lang="fr-FR" sz="1800" b="0" i="0" dirty="0" smtClean="0"/>
+              <a:t> to </a:t>
+            </a:r>
+            <a:r>
+              <a:rPr lang="fr-FR" sz="1800" b="0" i="0" smtClean="0"/>
+              <a:t>eXo</a:t>
+            </a:r>
+            <a:endParaRPr lang="fr-FR" sz="1800" b="0" i="0" dirty="0"/>
+          </a:p>
+          <a:p>
+            <a:pPr marL="3175" indent="0">
+              <a:lnSpc>
+                <a:spcPct val="100000"/>
+              </a:lnSpc>
+              <a:buClr>
+                <a:srgbClr val="FF9900"/>
+              </a:buClr>
+              <a:buSzPct val="120000"/>
+              <a:buNone/>
+            </a:pPr>
+            <a:endParaRPr lang="fr-FR" sz="2200" i="0" dirty="0" smtClean="0"/>
+          </a:p>
+          <a:p>
+            <a:pPr>
+              <a:lnSpc>
+                <a:spcPct val="100000"/>
+              </a:lnSpc>
+              <a:buClr>
+                <a:srgbClr val="FF9900"/>
+              </a:buClr>
+              <a:buSzPct val="120000"/>
+              <a:buFont typeface="Lucida Grande"/>
+              <a:buChar char="»"/>
+            </a:pPr>
+            <a:endParaRPr lang="fr-FR" sz="2200" b="0" i="0" dirty="0"/>
+          </a:p>
+          <a:p>
+            <a:pPr marL="3175" indent="0">
+              <a:buNone/>
+            </a:pPr>
+            <a:endParaRPr lang="fr-FR" sz="1800" b="0" i="0" dirty="0">
+              <a:solidFill>
+                <a:schemeClr val="tx1">
+                  <a:lumMod val="75000"/>
+                  <a:lumOff val="25000"/>
+                </a:schemeClr>
+              </a:solidFill>
+            </a:endParaRPr>
+          </a:p>
+          <a:p>
+            <a:pPr>
+              <a:lnSpc>
+                <a:spcPct val="100000"/>
+              </a:lnSpc>
+              <a:buClr>
+                <a:srgbClr val="FF9900"/>
+              </a:buClr>
+              <a:buSzPct val="120000"/>
+              <a:buFont typeface="Lucida Grande"/>
+              <a:buChar char="»"/>
+            </a:pPr>
+            <a:endParaRPr lang="fr-FR" sz="1800" b="0" i="0" dirty="0">
+              <a:solidFill>
+                <a:schemeClr val="tx1">
+                  <a:lumMod val="75000"/>
+                  <a:lumOff val="25000"/>
+                </a:schemeClr>
+              </a:solidFill>
+            </a:endParaRPr>
+          </a:p>
+          <a:p>
+            <a:pPr>
+              <a:lnSpc>
+                <a:spcPct val="100000"/>
+              </a:lnSpc>
+              <a:buClr>
+                <a:srgbClr val="FF9900"/>
+              </a:buClr>
+              <a:buSzPct val="120000"/>
+              <a:buFont typeface="Lucida Grande"/>
+              <a:buChar char="»"/>
+            </a:pPr>
+            <a:endParaRPr lang="fr-FR" sz="1800" i="0" dirty="0">
+              <a:solidFill>
+                <a:schemeClr val="tx1">
+                  <a:lumMod val="75000"/>
+                  <a:lumOff val="25000"/>
+                </a:schemeClr>
+              </a:solidFill>
+            </a:endParaRPr>
+          </a:p>
+          <a:p>
+            <a:pPr>
+              <a:lnSpc>
+                <a:spcPct val="100000"/>
+              </a:lnSpc>
+              <a:buClr>
+                <a:srgbClr val="FF9900"/>
+              </a:buClr>
+              <a:buSzPct val="120000"/>
+              <a:buFont typeface="Lucida Grande"/>
+              <a:buChar char="»"/>
+            </a:pPr>
+            <a:endParaRPr lang="fr-FR" sz="1800" i="0" dirty="0">
+              <a:solidFill>
+                <a:schemeClr val="tx1">
+                  <a:lumMod val="75000"/>
+                  <a:lumOff val="25000"/>
+                </a:schemeClr>
+              </a:solidFill>
+            </a:endParaRPr>
+          </a:p>
+        </p:txBody>
+      </p:sp>
+    </p:spTree>
+    <p:extLst>
+      <p:ext uri="{BB962C8B-B14F-4D97-AF65-F5344CB8AC3E}">
+        <p14:creationId xmlns:p14="http://schemas.microsoft.com/office/powerpoint/2010/main" val="364395727"/>
+      </p:ext>
+    </p:extLst>
+  </p:cSld>
+  <p:clrMapOvr>
+    <a:masterClrMapping/>
+  </p:clrMapOvr>
+  <p:transition xmlns:p14="http://schemas.microsoft.com/office/powerpoint/2010/main"/>
+  <p:timing>
+    <p:tnLst>
+      <p:par>
+        <p:cTn xmlns:p14="http://schemas.microsoft.com/office/powerpoint/2010/main" id="1" dur="indefinite" restart="never" nodeType="tmRoot"/>
+      </p:par>
+    </p:tnLst>
+  </p:timing>
+</p:sld>
+</file>
+
+<file path=ppt/slides/slide42.xml><?xml version="1.0" encoding="utf-8"?>
 <p:sld xmlns:a="http://schemas.openxmlformats.org/drawingml/2006/main" xmlns:r="http://schemas.openxmlformats.org/officeDocument/2006/relationships" xmlns:p="http://schemas.openxmlformats.org/presentationml/2006/main">
   <p:cSld>
     <p:spTree>
@@ -44544,848 +47775,6 @@
             </p:seq>
           </p:childTnLst>
         </p:cTn>
-      </p:par>
-    </p:tnLst>
-  </p:timing>
-</p:sld>
-</file>
-
-<file path=ppt/slides/slide4.xml><?xml version="1.0" encoding="utf-8"?>
-<p:sld xmlns:a="http://schemas.openxmlformats.org/drawingml/2006/main" xmlns:r="http://schemas.openxmlformats.org/officeDocument/2006/relationships" xmlns:p="http://schemas.openxmlformats.org/presentationml/2006/main">
-  <p:cSld>
-    <p:spTree>
-      <p:nvGrpSpPr>
-        <p:cNvPr id="1" name=""/>
-        <p:cNvGrpSpPr/>
-        <p:nvPr/>
-      </p:nvGrpSpPr>
-      <p:grpSpPr>
-        <a:xfrm>
-          <a:off x="0" y="0"/>
-          <a:ext cx="0" cy="0"/>
-          <a:chOff x="0" y="0"/>
-          <a:chExt cx="0" cy="0"/>
-        </a:xfrm>
-      </p:grpSpPr>
-      <p:sp>
-        <p:nvSpPr>
-          <p:cNvPr id="15362" name="Rectangle 1"/>
-          <p:cNvSpPr>
-            <a:spLocks noGrp="1" noChangeArrowheads="1"/>
-          </p:cNvSpPr>
-          <p:nvPr>
-            <p:ph type="title"/>
-          </p:nvPr>
-        </p:nvSpPr>
-        <p:spPr>
-          <a:xfrm>
-            <a:off x="490435" y="255926"/>
-            <a:ext cx="10179255" cy="454024"/>
-          </a:xfrm>
-        </p:spPr>
-        <p:txBody>
-          <a:bodyPr rIns="41783" anchor="b"/>
-          <a:lstStyle/>
-          <a:p>
-            <a:r>
-              <a:rPr lang="fr-FR" dirty="0" err="1"/>
-              <a:t>Overview</a:t>
-            </a:r>
-            <a:r>
-              <a:rPr lang="fr-FR" dirty="0"/>
-              <a:t> of the </a:t>
-            </a:r>
-            <a:r>
-              <a:rPr lang="fr-FR" dirty="0" err="1"/>
-              <a:t>Organizational</a:t>
-            </a:r>
-            <a:r>
-              <a:rPr lang="fr-FR" dirty="0"/>
-              <a:t> Model</a:t>
-            </a:r>
-          </a:p>
-        </p:txBody>
-      </p:sp>
-      <p:sp>
-        <p:nvSpPr>
-          <p:cNvPr id="15363" name="Rectangle 2"/>
-          <p:cNvSpPr>
-            <a:spLocks noGrp="1" noChangeArrowheads="1"/>
-          </p:cNvSpPr>
-          <p:nvPr>
-            <p:ph type="body" idx="1"/>
-          </p:nvPr>
-        </p:nvSpPr>
-        <p:spPr>
-          <a:xfrm>
-            <a:off x="467494" y="1350945"/>
-            <a:ext cx="10219725" cy="5089000"/>
-          </a:xfrm>
-        </p:spPr>
-        <p:txBody>
-          <a:bodyPr rIns="41783" anchor="t"/>
-          <a:lstStyle/>
-          <a:p>
-            <a:pPr marL="265113" lvl="1" indent="-265113">
-              <a:lnSpc>
-                <a:spcPct val="100000"/>
-              </a:lnSpc>
-            </a:pPr>
-            <a:r>
-              <a:rPr lang="fr-FR" i="0" dirty="0" smtClean="0">
-                <a:solidFill>
-                  <a:schemeClr val="tx1">
-                    <a:lumMod val="75000"/>
-                    <a:lumOff val="25000"/>
-                  </a:schemeClr>
-                </a:solidFill>
-              </a:rPr>
-              <a:t>User </a:t>
-            </a:r>
-            <a:endParaRPr lang="fr-FR" i="0" dirty="0">
-              <a:solidFill>
-                <a:schemeClr val="tx1">
-                  <a:lumMod val="75000"/>
-                  <a:lumOff val="25000"/>
-                </a:schemeClr>
-              </a:solidFill>
-            </a:endParaRPr>
-          </a:p>
-          <a:p>
-            <a:pPr marL="3175" indent="0">
-              <a:buNone/>
-            </a:pPr>
-            <a:r>
-              <a:rPr lang="fr-FR" sz="2200" i="0" dirty="0" smtClean="0">
-                <a:solidFill>
-                  <a:schemeClr val="tx1">
-                    <a:lumMod val="75000"/>
-                    <a:lumOff val="25000"/>
-                  </a:schemeClr>
-                </a:solidFill>
-              </a:rPr>
-              <a:t>	- </a:t>
-            </a:r>
-            <a:r>
-              <a:rPr lang="fr-FR" sz="2200" i="0" dirty="0" err="1">
-                <a:solidFill>
-                  <a:schemeClr val="tx1">
-                    <a:lumMod val="75000"/>
-                    <a:lumOff val="25000"/>
-                  </a:schemeClr>
-                </a:solidFill>
-              </a:rPr>
-              <a:t>Username</a:t>
-            </a:r>
-            <a:r>
-              <a:rPr lang="fr-FR" sz="2200" i="0" dirty="0">
-                <a:solidFill>
-                  <a:schemeClr val="tx1">
-                    <a:lumMod val="75000"/>
-                    <a:lumOff val="25000"/>
-                  </a:schemeClr>
-                </a:solidFill>
-              </a:rPr>
-              <a:t> </a:t>
-            </a:r>
-            <a:r>
-              <a:rPr lang="fr-FR" sz="2200" i="0" dirty="0" err="1">
-                <a:solidFill>
-                  <a:schemeClr val="tx1">
-                    <a:lumMod val="75000"/>
-                    <a:lumOff val="25000"/>
-                  </a:schemeClr>
-                </a:solidFill>
-              </a:rPr>
-              <a:t>used</a:t>
-            </a:r>
-            <a:r>
-              <a:rPr lang="fr-FR" sz="2200" i="0" dirty="0">
-                <a:solidFill>
-                  <a:schemeClr val="tx1">
-                    <a:lumMod val="75000"/>
-                    <a:lumOff val="25000"/>
-                  </a:schemeClr>
-                </a:solidFill>
-              </a:rPr>
-              <a:t> as the </a:t>
-            </a:r>
-            <a:r>
-              <a:rPr lang="fr-FR" sz="2200" i="0" dirty="0" err="1">
-                <a:solidFill>
-                  <a:schemeClr val="tx1">
-                    <a:lumMod val="75000"/>
-                    <a:lumOff val="25000"/>
-                  </a:schemeClr>
-                </a:solidFill>
-              </a:rPr>
-              <a:t>identified</a:t>
-            </a:r>
-            <a:r>
-              <a:rPr lang="fr-FR" sz="2200" i="0" dirty="0">
-                <a:solidFill>
-                  <a:schemeClr val="tx1">
-                    <a:lumMod val="75000"/>
-                    <a:lumOff val="25000"/>
-                  </a:schemeClr>
-                </a:solidFill>
-              </a:rPr>
-              <a:t> Profile (</a:t>
-            </a:r>
-            <a:r>
-              <a:rPr lang="fr-FR" sz="2200" i="0" dirty="0" err="1">
-                <a:solidFill>
-                  <a:schemeClr val="tx1">
-                    <a:lumMod val="75000"/>
-                    <a:lumOff val="25000"/>
-                  </a:schemeClr>
-                </a:solidFill>
-              </a:rPr>
-              <a:t>identity</a:t>
-            </a:r>
-            <a:r>
-              <a:rPr lang="fr-FR" sz="2200" i="0" dirty="0">
-                <a:solidFill>
-                  <a:schemeClr val="tx1">
-                    <a:lumMod val="75000"/>
-                    <a:lumOff val="25000"/>
-                  </a:schemeClr>
-                </a:solidFill>
-              </a:rPr>
-              <a:t> and </a:t>
-            </a:r>
-            <a:r>
-              <a:rPr lang="fr-FR" sz="2200" i="0" dirty="0" err="1">
-                <a:solidFill>
-                  <a:schemeClr val="tx1">
-                    <a:lumMod val="75000"/>
-                    <a:lumOff val="25000"/>
-                  </a:schemeClr>
-                </a:solidFill>
-              </a:rPr>
-              <a:t>preferences</a:t>
-            </a:r>
-            <a:r>
-              <a:rPr lang="fr-FR" sz="2200" i="0" dirty="0" smtClean="0">
-                <a:solidFill>
-                  <a:schemeClr val="tx1">
-                    <a:lumMod val="75000"/>
-                    <a:lumOff val="25000"/>
-                  </a:schemeClr>
-                </a:solidFill>
-              </a:rPr>
-              <a:t>)</a:t>
-            </a:r>
-          </a:p>
-          <a:p>
-            <a:pPr>
-              <a:buClr>
-                <a:srgbClr val="FF9900"/>
-              </a:buClr>
-              <a:buSzPct val="120000"/>
-              <a:buFont typeface="Lucida Grande"/>
-              <a:buChar char="»"/>
-            </a:pPr>
-            <a:endParaRPr lang="fr-FR" sz="2200" dirty="0" smtClean="0">
-              <a:solidFill>
-                <a:schemeClr val="tx1">
-                  <a:lumMod val="75000"/>
-                  <a:lumOff val="25000"/>
-                </a:schemeClr>
-              </a:solidFill>
-            </a:endParaRPr>
-          </a:p>
-          <a:p>
-            <a:pPr>
-              <a:buClr>
-                <a:srgbClr val="FF9900"/>
-              </a:buClr>
-              <a:buSzPct val="120000"/>
-              <a:buFont typeface="Lucida Grande"/>
-              <a:buChar char="»"/>
-            </a:pPr>
-            <a:r>
-              <a:rPr lang="fr-FR" sz="2200" i="0" dirty="0" smtClean="0">
-                <a:solidFill>
-                  <a:schemeClr val="tx1">
-                    <a:lumMod val="75000"/>
-                    <a:lumOff val="25000"/>
-                  </a:schemeClr>
-                </a:solidFill>
-              </a:rPr>
-              <a:t>Group </a:t>
-            </a:r>
-            <a:endParaRPr lang="fr-FR" sz="2200" i="0" dirty="0">
-              <a:solidFill>
-                <a:schemeClr val="tx1">
-                  <a:lumMod val="75000"/>
-                  <a:lumOff val="25000"/>
-                </a:schemeClr>
-              </a:solidFill>
-            </a:endParaRPr>
-          </a:p>
-          <a:p>
-            <a:pPr marL="3175" indent="0">
-              <a:buClr>
-                <a:srgbClr val="FF9900"/>
-              </a:buClr>
-              <a:buNone/>
-            </a:pPr>
-            <a:r>
-              <a:rPr lang="fr-FR" sz="2200" i="0" dirty="0">
-                <a:solidFill>
-                  <a:schemeClr val="tx1">
-                    <a:lumMod val="75000"/>
-                    <a:lumOff val="25000"/>
-                  </a:schemeClr>
-                </a:solidFill>
-              </a:rPr>
-              <a:t>	</a:t>
-            </a:r>
-            <a:r>
-              <a:rPr lang="fr-FR" sz="2200" i="0" dirty="0" smtClean="0">
-                <a:solidFill>
-                  <a:schemeClr val="tx1">
-                    <a:lumMod val="75000"/>
-                    <a:lumOff val="25000"/>
-                  </a:schemeClr>
-                </a:solidFill>
-              </a:rPr>
-              <a:t>- </a:t>
-            </a:r>
-            <a:r>
-              <a:rPr lang="fr-FR" sz="2200" i="0" dirty="0" err="1" smtClean="0">
-                <a:solidFill>
-                  <a:schemeClr val="tx1">
-                    <a:lumMod val="75000"/>
-                    <a:lumOff val="25000"/>
-                  </a:schemeClr>
-                </a:solidFill>
-              </a:rPr>
-              <a:t>Gather</a:t>
-            </a:r>
-            <a:r>
-              <a:rPr lang="fr-FR" sz="2200" i="0" dirty="0" smtClean="0">
-                <a:solidFill>
-                  <a:schemeClr val="tx1">
-                    <a:lumMod val="75000"/>
-                    <a:lumOff val="25000"/>
-                  </a:schemeClr>
-                </a:solidFill>
-              </a:rPr>
-              <a:t> </a:t>
-            </a:r>
-            <a:r>
-              <a:rPr lang="fr-FR" sz="2200" i="0" dirty="0">
-                <a:solidFill>
-                  <a:schemeClr val="tx1">
-                    <a:lumMod val="75000"/>
-                    <a:lumOff val="25000"/>
-                  </a:schemeClr>
-                </a:solidFill>
-              </a:rPr>
-              <a:t>a set of </a:t>
-            </a:r>
-            <a:r>
-              <a:rPr lang="fr-FR" sz="2200" i="0" dirty="0" err="1">
-                <a:solidFill>
-                  <a:schemeClr val="tx1">
-                    <a:lumMod val="75000"/>
-                    <a:lumOff val="25000"/>
-                  </a:schemeClr>
-                </a:solidFill>
-              </a:rPr>
-              <a:t>users</a:t>
-            </a:r>
-            <a:r>
-              <a:rPr lang="fr-FR" sz="2200" i="0" dirty="0">
-                <a:solidFill>
-                  <a:schemeClr val="tx1">
-                    <a:lumMod val="75000"/>
-                    <a:lumOff val="25000"/>
-                  </a:schemeClr>
-                </a:solidFill>
-              </a:rPr>
-              <a:t> Applicative or business </a:t>
-            </a:r>
-          </a:p>
-          <a:p>
-            <a:pPr marL="3175" indent="0">
-              <a:buNone/>
-            </a:pPr>
-            <a:r>
-              <a:rPr lang="fr-FR" sz="2200" i="0" dirty="0">
-                <a:solidFill>
-                  <a:schemeClr val="tx1">
-                    <a:lumMod val="75000"/>
-                    <a:lumOff val="25000"/>
-                  </a:schemeClr>
-                </a:solidFill>
-              </a:rPr>
-              <a:t>	</a:t>
-            </a:r>
-            <a:r>
-              <a:rPr lang="fr-FR" sz="2200" i="0" dirty="0" smtClean="0">
-                <a:solidFill>
-                  <a:schemeClr val="tx1">
-                    <a:lumMod val="75000"/>
-                    <a:lumOff val="25000"/>
-                  </a:schemeClr>
-                </a:solidFill>
-              </a:rPr>
-              <a:t>- </a:t>
-            </a:r>
-            <a:r>
-              <a:rPr lang="fr-FR" sz="2200" i="0" dirty="0" err="1">
-                <a:solidFill>
-                  <a:schemeClr val="tx1">
-                    <a:lumMod val="75000"/>
-                    <a:lumOff val="25000"/>
-                  </a:schemeClr>
-                </a:solidFill>
-              </a:rPr>
-              <a:t>Tree</a:t>
-            </a:r>
-            <a:r>
-              <a:rPr lang="fr-FR" sz="2200" i="0" dirty="0">
-                <a:solidFill>
-                  <a:schemeClr val="tx1">
-                    <a:lumMod val="75000"/>
-                    <a:lumOff val="25000"/>
-                  </a:schemeClr>
-                </a:solidFill>
-              </a:rPr>
-              <a:t> </a:t>
-            </a:r>
-            <a:r>
-              <a:rPr lang="fr-FR" sz="2200" i="0" dirty="0" err="1">
-                <a:solidFill>
-                  <a:schemeClr val="tx1">
-                    <a:lumMod val="75000"/>
-                    <a:lumOff val="25000"/>
-                  </a:schemeClr>
-                </a:solidFill>
-              </a:rPr>
-              <a:t>structureNo</a:t>
-            </a:r>
-            <a:r>
-              <a:rPr lang="fr-FR" sz="2200" i="0" dirty="0">
-                <a:solidFill>
-                  <a:schemeClr val="tx1">
-                    <a:lumMod val="75000"/>
-                    <a:lumOff val="25000"/>
-                  </a:schemeClr>
-                </a:solidFill>
-              </a:rPr>
-              <a:t> </a:t>
-            </a:r>
-            <a:r>
-              <a:rPr lang="fr-FR" sz="2200" i="0" dirty="0" err="1" smtClean="0">
-                <a:solidFill>
-                  <a:schemeClr val="tx1">
-                    <a:lumMod val="75000"/>
-                    <a:lumOff val="25000"/>
-                  </a:schemeClr>
-                </a:solidFill>
-              </a:rPr>
-              <a:t>inheritance</a:t>
-            </a:r>
-            <a:endParaRPr lang="fr-FR" sz="2200" i="0" dirty="0" smtClean="0">
-              <a:solidFill>
-                <a:schemeClr val="tx1">
-                  <a:lumMod val="75000"/>
-                  <a:lumOff val="25000"/>
-                </a:schemeClr>
-              </a:solidFill>
-            </a:endParaRPr>
-          </a:p>
-          <a:p>
-            <a:pPr marL="3175" indent="0">
-              <a:buNone/>
-            </a:pPr>
-            <a:r>
-              <a:rPr lang="fr-FR" sz="2200" dirty="0">
-                <a:solidFill>
-                  <a:schemeClr val="tx1">
-                    <a:lumMod val="75000"/>
-                    <a:lumOff val="25000"/>
-                  </a:schemeClr>
-                </a:solidFill>
-              </a:rPr>
-              <a:t>	</a:t>
-            </a:r>
-            <a:r>
-              <a:rPr lang="fr-FR" sz="2200" dirty="0" err="1" smtClean="0">
-                <a:solidFill>
-                  <a:schemeClr val="tx1">
-                    <a:lumMod val="75000"/>
-                    <a:lumOff val="25000"/>
-                  </a:schemeClr>
-                </a:solidFill>
-              </a:rPr>
-              <a:t>Expressed</a:t>
-            </a:r>
-            <a:r>
-              <a:rPr lang="fr-FR" sz="2200" dirty="0" smtClean="0">
-                <a:solidFill>
-                  <a:schemeClr val="tx1">
-                    <a:lumMod val="75000"/>
-                    <a:lumOff val="25000"/>
-                  </a:schemeClr>
-                </a:solidFill>
-              </a:rPr>
-              <a:t> </a:t>
-            </a:r>
-            <a:r>
-              <a:rPr lang="fr-FR" sz="2200" dirty="0">
-                <a:solidFill>
-                  <a:schemeClr val="tx1">
-                    <a:lumMod val="75000"/>
-                    <a:lumOff val="25000"/>
-                  </a:schemeClr>
-                </a:solidFill>
-              </a:rPr>
-              <a:t>as /group/</a:t>
-            </a:r>
-            <a:r>
-              <a:rPr lang="fr-FR" sz="2200" dirty="0" err="1">
-                <a:solidFill>
-                  <a:schemeClr val="tx1">
-                    <a:lumMod val="75000"/>
-                    <a:lumOff val="25000"/>
-                  </a:schemeClr>
-                </a:solidFill>
-              </a:rPr>
-              <a:t>subgroup</a:t>
-            </a:r>
-            <a:r>
-              <a:rPr lang="fr-FR" sz="2200" dirty="0">
-                <a:solidFill>
-                  <a:schemeClr val="tx1">
-                    <a:lumMod val="75000"/>
-                    <a:lumOff val="25000"/>
-                  </a:schemeClr>
-                </a:solidFill>
-              </a:rPr>
-              <a:t>/</a:t>
-            </a:r>
-            <a:r>
-              <a:rPr lang="fr-FR" sz="2200" dirty="0" err="1">
-                <a:solidFill>
-                  <a:schemeClr val="tx1">
-                    <a:lumMod val="75000"/>
-                    <a:lumOff val="25000"/>
-                  </a:schemeClr>
-                </a:solidFill>
-              </a:rPr>
-              <a:t>subsubgroup</a:t>
-            </a:r>
-            <a:endParaRPr lang="fr-FR" sz="2200" dirty="0">
-              <a:solidFill>
-                <a:schemeClr val="tx1">
-                  <a:lumMod val="75000"/>
-                  <a:lumOff val="25000"/>
-                </a:schemeClr>
-              </a:solidFill>
-            </a:endParaRPr>
-          </a:p>
-          <a:p>
-            <a:endParaRPr lang="fr-FR" sz="2200" dirty="0">
-              <a:solidFill>
-                <a:schemeClr val="tx1">
-                  <a:lumMod val="75000"/>
-                  <a:lumOff val="25000"/>
-                </a:schemeClr>
-              </a:solidFill>
-            </a:endParaRPr>
-          </a:p>
-          <a:p>
-            <a:pPr>
-              <a:buClr>
-                <a:srgbClr val="FF9900"/>
-              </a:buClr>
-              <a:buSzPct val="120000"/>
-              <a:buFont typeface="Lucida Grande"/>
-              <a:buChar char="»"/>
-            </a:pPr>
-            <a:r>
-              <a:rPr lang="fr-FR" sz="2200" i="0" dirty="0" err="1">
-                <a:solidFill>
-                  <a:schemeClr val="tx1">
-                    <a:lumMod val="75000"/>
-                    <a:lumOff val="25000"/>
-                  </a:schemeClr>
-                </a:solidFill>
-              </a:rPr>
-              <a:t>Membership</a:t>
-            </a:r>
-            <a:endParaRPr lang="fr-FR" sz="2200" i="0" dirty="0">
-              <a:solidFill>
-                <a:schemeClr val="tx1">
-                  <a:lumMod val="75000"/>
-                  <a:lumOff val="25000"/>
-                </a:schemeClr>
-              </a:solidFill>
-            </a:endParaRPr>
-          </a:p>
-          <a:p>
-            <a:pPr marL="3175" indent="0">
-              <a:buNone/>
-            </a:pPr>
-            <a:r>
-              <a:rPr lang="fr-FR" sz="2200" i="0" dirty="0" smtClean="0">
-                <a:solidFill>
-                  <a:schemeClr val="tx1">
-                    <a:lumMod val="75000"/>
-                    <a:lumOff val="25000"/>
-                  </a:schemeClr>
-                </a:solidFill>
-              </a:rPr>
-              <a:t>	- </a:t>
-            </a:r>
-            <a:r>
-              <a:rPr lang="fr-FR" sz="2200" i="0" dirty="0">
-                <a:solidFill>
-                  <a:schemeClr val="tx1">
-                    <a:lumMod val="75000"/>
-                    <a:lumOff val="25000"/>
-                  </a:schemeClr>
-                </a:solidFill>
-              </a:rPr>
-              <a:t>Qualifies the group </a:t>
-            </a:r>
-            <a:r>
-              <a:rPr lang="fr-FR" sz="2200" i="0" dirty="0" err="1">
-                <a:solidFill>
-                  <a:schemeClr val="tx1">
-                    <a:lumMod val="75000"/>
-                    <a:lumOff val="25000"/>
-                  </a:schemeClr>
-                </a:solidFill>
-              </a:rPr>
-              <a:t>belonging</a:t>
-            </a:r>
-            <a:endParaRPr lang="fr-FR" sz="2200" i="0" dirty="0">
-              <a:solidFill>
-                <a:schemeClr val="tx1">
-                  <a:lumMod val="75000"/>
-                  <a:lumOff val="25000"/>
-                </a:schemeClr>
-              </a:solidFill>
-            </a:endParaRPr>
-          </a:p>
-          <a:p>
-            <a:pPr marL="3175" indent="0">
-              <a:buNone/>
-            </a:pPr>
-            <a:r>
-              <a:rPr lang="fr-FR" sz="2200" i="0" dirty="0">
-                <a:solidFill>
-                  <a:schemeClr val="tx1">
-                    <a:lumMod val="75000"/>
-                    <a:lumOff val="25000"/>
-                  </a:schemeClr>
-                </a:solidFill>
-              </a:rPr>
-              <a:t>	</a:t>
-            </a:r>
-            <a:r>
-              <a:rPr lang="fr-FR" sz="2200" i="0" dirty="0" smtClean="0">
-                <a:solidFill>
-                  <a:schemeClr val="tx1">
-                    <a:lumMod val="75000"/>
-                    <a:lumOff val="25000"/>
-                  </a:schemeClr>
-                </a:solidFill>
-              </a:rPr>
-              <a:t>- </a:t>
-            </a:r>
-            <a:r>
-              <a:rPr lang="fr-FR" sz="2200" i="0" dirty="0">
-                <a:solidFill>
-                  <a:schemeClr val="tx1">
-                    <a:lumMod val="75000"/>
-                    <a:lumOff val="25000"/>
-                  </a:schemeClr>
-                </a:solidFill>
-              </a:rPr>
-              <a:t>"</a:t>
-            </a:r>
-            <a:r>
-              <a:rPr lang="fr-FR" sz="2200" i="0" dirty="0" err="1">
-                <a:solidFill>
-                  <a:schemeClr val="tx1">
-                    <a:lumMod val="75000"/>
-                    <a:lumOff val="25000"/>
-                  </a:schemeClr>
-                </a:solidFill>
-              </a:rPr>
-              <a:t>Member</a:t>
-            </a:r>
-            <a:r>
-              <a:rPr lang="fr-FR" sz="2200" i="0" dirty="0">
-                <a:solidFill>
-                  <a:schemeClr val="tx1">
-                    <a:lumMod val="75000"/>
-                    <a:lumOff val="25000"/>
-                  </a:schemeClr>
-                </a:solidFill>
-              </a:rPr>
-              <a:t> of group as </a:t>
-            </a:r>
-            <a:r>
-              <a:rPr lang="fr-FR" sz="2200" i="0" dirty="0" smtClean="0">
-                <a:solidFill>
-                  <a:schemeClr val="tx1">
-                    <a:lumMod val="75000"/>
-                    <a:lumOff val="25000"/>
-                  </a:schemeClr>
-                </a:solidFill>
-              </a:rPr>
-              <a:t>XXX »</a:t>
-            </a:r>
-            <a:endParaRPr lang="fr-FR" sz="2400" i="0" dirty="0" smtClean="0"/>
-          </a:p>
-          <a:p>
-            <a:pPr marL="3175" indent="0">
-              <a:buNone/>
-            </a:pPr>
-            <a:r>
-              <a:rPr lang="fr-FR" sz="2400" dirty="0"/>
-              <a:t>	</a:t>
-            </a:r>
-            <a:r>
-              <a:rPr lang="fr-FR" sz="2200" dirty="0" err="1" smtClean="0">
-                <a:solidFill>
-                  <a:schemeClr val="tx1">
-                    <a:lumMod val="75000"/>
-                    <a:lumOff val="25000"/>
-                  </a:schemeClr>
-                </a:solidFill>
-              </a:rPr>
-              <a:t>Expressed</a:t>
-            </a:r>
-            <a:r>
-              <a:rPr lang="fr-FR" sz="2200" dirty="0" smtClean="0">
-                <a:solidFill>
-                  <a:schemeClr val="tx1">
-                    <a:lumMod val="75000"/>
-                    <a:lumOff val="25000"/>
-                  </a:schemeClr>
-                </a:solidFill>
-              </a:rPr>
-              <a:t> </a:t>
-            </a:r>
-            <a:r>
-              <a:rPr lang="fr-FR" sz="2200" dirty="0">
-                <a:solidFill>
-                  <a:schemeClr val="tx1">
-                    <a:lumMod val="75000"/>
-                    <a:lumOff val="25000"/>
-                  </a:schemeClr>
-                </a:solidFill>
-              </a:rPr>
-              <a:t>as : manager:/</a:t>
-            </a:r>
-            <a:r>
-              <a:rPr lang="fr-FR" sz="2200" dirty="0" err="1">
-                <a:solidFill>
-                  <a:schemeClr val="tx1">
-                    <a:lumMod val="75000"/>
-                    <a:lumOff val="25000"/>
-                  </a:schemeClr>
-                </a:solidFill>
-              </a:rPr>
-              <a:t>organization</a:t>
-            </a:r>
-            <a:r>
-              <a:rPr lang="fr-FR" sz="2200" dirty="0">
-                <a:solidFill>
-                  <a:schemeClr val="tx1">
-                    <a:lumMod val="75000"/>
-                    <a:lumOff val="25000"/>
-                  </a:schemeClr>
-                </a:solidFill>
-              </a:rPr>
-              <a:t>/</a:t>
-            </a:r>
-            <a:r>
-              <a:rPr lang="fr-FR" sz="2200" dirty="0" err="1">
-                <a:solidFill>
-                  <a:schemeClr val="tx1">
-                    <a:lumMod val="75000"/>
-                    <a:lumOff val="25000"/>
-                  </a:schemeClr>
-                </a:solidFill>
-              </a:rPr>
-              <a:t>hr</a:t>
-            </a:r>
-            <a:r>
-              <a:rPr lang="fr-FR" sz="2200" dirty="0">
-                <a:solidFill>
-                  <a:schemeClr val="tx1">
-                    <a:lumMod val="75000"/>
-                    <a:lumOff val="25000"/>
-                  </a:schemeClr>
-                </a:solidFill>
-              </a:rPr>
-              <a:t>, *:/</a:t>
-            </a:r>
-            <a:r>
-              <a:rPr lang="fr-FR" sz="2200" dirty="0" err="1">
-                <a:solidFill>
-                  <a:schemeClr val="tx1">
-                    <a:lumMod val="75000"/>
-                    <a:lumOff val="25000"/>
-                  </a:schemeClr>
-                </a:solidFill>
-              </a:rPr>
-              <a:t>partners</a:t>
-            </a:r>
-            <a:endParaRPr lang="fr-FR" sz="2200" dirty="0" smtClean="0">
-              <a:solidFill>
-                <a:schemeClr val="tx1">
-                  <a:lumMod val="75000"/>
-                  <a:lumOff val="25000"/>
-                </a:schemeClr>
-              </a:solidFill>
-            </a:endParaRPr>
-          </a:p>
-          <a:p>
-            <a:pPr marL="3175" indent="0">
-              <a:buNone/>
-            </a:pPr>
-            <a:endParaRPr lang="fr-FR" sz="2000" dirty="0"/>
-          </a:p>
-          <a:p>
-            <a:pPr marL="3175" indent="0">
-              <a:buNone/>
-            </a:pPr>
-            <a:endParaRPr lang="fr-FR" sz="2000" dirty="0"/>
-          </a:p>
-          <a:p>
-            <a:pPr marL="3175" indent="0">
-              <a:buNone/>
-            </a:pPr>
-            <a:endParaRPr lang="fr-FR" dirty="0"/>
-          </a:p>
-        </p:txBody>
-      </p:sp>
-    </p:spTree>
-    <p:extLst>
-      <p:ext uri="{BB962C8B-B14F-4D97-AF65-F5344CB8AC3E}">
-        <p14:creationId xmlns:p14="http://schemas.microsoft.com/office/powerpoint/2010/main" val="2439149100"/>
-      </p:ext>
-    </p:extLst>
-  </p:cSld>
-  <p:clrMapOvr>
-    <a:masterClrMapping/>
-  </p:clrMapOvr>
-  <p:transition xmlns:p14="http://schemas.microsoft.com/office/powerpoint/2010/main"/>
-  <p:timing>
-    <p:tnLst>
-      <p:par>
-        <p:cTn xmlns:p14="http://schemas.microsoft.com/office/powerpoint/2010/main" id="1" dur="indefinite" restart="never" nodeType="tmRoot"/>
       </p:par>
     </p:tnLst>
   </p:timing>

</xml_diff>